<commit_message>
nu stiu ce mai e aici
</commit_message>
<xml_diff>
--- a/OldBank - Banking pentru Viitorul Nostalgic.pptx
+++ b/OldBank - Banking pentru Viitorul Nostalgic.pptx
@@ -9,12 +9,12 @@
   </p:notesMasterIdLst>
   <p:sldIdLst>
     <p:sldId id="256" r:id="rId2"/>
-    <p:sldId id="257" r:id="rId3"/>
-    <p:sldId id="258" r:id="rId4"/>
-    <p:sldId id="259" r:id="rId5"/>
-    <p:sldId id="260" r:id="rId6"/>
-    <p:sldId id="261" r:id="rId7"/>
-    <p:sldId id="262" r:id="rId8"/>
+    <p:sldId id="258" r:id="rId3"/>
+    <p:sldId id="259" r:id="rId4"/>
+    <p:sldId id="260" r:id="rId5"/>
+    <p:sldId id="261" r:id="rId6"/>
+    <p:sldId id="262" r:id="rId7"/>
+    <p:sldId id="264" r:id="rId8"/>
     <p:sldId id="263" r:id="rId9"/>
   </p:sldIdLst>
   <p:sldSz cx="12192000" cy="6858000"/>
@@ -749,90 +749,6 @@
 </file>
 
 <file path=ppt/notesSlides/notesSlide7.xml><?xml version="1.0" encoding="utf-8"?>
-<p:notes xmlns:a="http://schemas.openxmlformats.org/drawingml/2006/main" xmlns:r="http://schemas.openxmlformats.org/officeDocument/2006/relationships" xmlns:p="http://schemas.openxmlformats.org/presentationml/2006/main">
-  <p:cSld>
-    <p:spTree>
-      <p:nvGrpSpPr>
-        <p:cNvPr id="1" name=""/>
-        <p:cNvGrpSpPr/>
-        <p:nvPr/>
-      </p:nvGrpSpPr>
-      <p:grpSpPr>
-        <a:xfrm>
-          <a:off x="0" y="0"/>
-          <a:ext cx="0" cy="0"/>
-          <a:chOff x="0" y="0"/>
-          <a:chExt cx="0" cy="0"/>
-        </a:xfrm>
-      </p:grpSpPr>
-      <p:sp>
-        <p:nvSpPr>
-          <p:cNvPr id="2" name="Slide Image Placeholder 1"/>
-          <p:cNvSpPr>
-            <a:spLocks noGrp="1" noRot="1" noChangeAspect="1"/>
-          </p:cNvSpPr>
-          <p:nvPr>
-            <p:ph type="sldImg"/>
-          </p:nvPr>
-        </p:nvSpPr>
-        <p:spPr/>
-      </p:sp>
-      <p:sp>
-        <p:nvSpPr>
-          <p:cNvPr id="3" name="Notes Placeholder 2"/>
-          <p:cNvSpPr>
-            <a:spLocks noGrp="1"/>
-          </p:cNvSpPr>
-          <p:nvPr>
-            <p:ph type="body" idx="1"/>
-          </p:nvPr>
-        </p:nvSpPr>
-        <p:spPr/>
-        <p:txBody>
-          <a:bodyPr/>
-          <a:lstStyle/>
-          <a:p>
-            <a:endParaRPr lang="en-US" dirty="0"/>
-          </a:p>
-        </p:txBody>
-      </p:sp>
-      <p:sp>
-        <p:nvSpPr>
-          <p:cNvPr id="4" name="Slide Number Placeholder 3"/>
-          <p:cNvSpPr>
-            <a:spLocks noGrp="1"/>
-          </p:cNvSpPr>
-          <p:nvPr>
-            <p:ph type="sldNum" sz="quarter" idx="10"/>
-          </p:nvPr>
-        </p:nvSpPr>
-        <p:spPr/>
-        <p:txBody>
-          <a:bodyPr/>
-          <a:lstStyle/>
-          <a:p>
-            <a:fld id="{F7021451-1387-4CA6-816F-3879F97B5CBC}" type="slidenum">
-              <a:rPr lang="en-US"/>
-              <a:t>7</a:t>
-            </a:fld>
-            <a:endParaRPr lang="en-US"/>
-          </a:p>
-        </p:txBody>
-      </p:sp>
-    </p:spTree>
-    <p:extLst>
-      <p:ext uri="{BB962C8B-B14F-4D97-AF65-F5344CB8AC3E}">
-        <p14:creationId xmlns:p14="http://schemas.microsoft.com/office/powerpoint/2010/main" val="1024086991"/>
-      </p:ext>
-    </p:extLst>
-  </p:cSld>
-  <p:clrMapOvr>
-    <a:masterClrMapping/>
-  </p:clrMapOvr>
-</p:notes>
-</file>
-
-<file path=ppt/notesSlides/notesSlide8.xml><?xml version="1.0" encoding="utf-8"?>
 <p:notes xmlns:a="http://schemas.openxmlformats.org/drawingml/2006/main" xmlns:r="http://schemas.openxmlformats.org/officeDocument/2006/relationships" xmlns:p="http://schemas.openxmlformats.org/presentationml/2006/main">
   <p:cSld>
     <p:spTree>
@@ -1779,1069 +1695,6 @@
 
 <file path=ppt/slides/slide2.xml><?xml version="1.0" encoding="utf-8"?>
 <p:sld xmlns:a="http://schemas.openxmlformats.org/drawingml/2006/main" xmlns:r="http://schemas.openxmlformats.org/officeDocument/2006/relationships" xmlns:p="http://schemas.openxmlformats.org/presentationml/2006/main">
-  <p:cSld name="Slide 2">
-    <p:spTree>
-      <p:nvGrpSpPr>
-        <p:cNvPr id="1" name=""/>
-        <p:cNvGrpSpPr/>
-        <p:nvPr/>
-      </p:nvGrpSpPr>
-      <p:grpSpPr>
-        <a:xfrm>
-          <a:off x="0" y="0"/>
-          <a:ext cx="0" cy="0"/>
-          <a:chOff x="0" y="0"/>
-          <a:chExt cx="0" cy="0"/>
-        </a:xfrm>
-      </p:grpSpPr>
-      <p:pic>
-        <p:nvPicPr>
-          <p:cNvPr id="2" name="Image 0" descr="preencoded.png"/>
-          <p:cNvPicPr>
-            <a:picLocks noChangeAspect="1"/>
-          </p:cNvPicPr>
-          <p:nvPr/>
-        </p:nvPicPr>
-        <p:blipFill>
-          <a:blip r:embed="rId3"/>
-          <a:stretch>
-            <a:fillRect/>
-          </a:stretch>
-        </p:blipFill>
-        <p:spPr>
-          <a:xfrm>
-            <a:off x="0" y="0"/>
-            <a:ext cx="12192000" cy="6858000"/>
-          </a:xfrm>
-          <a:prstGeom prst="rect">
-            <a:avLst/>
-          </a:prstGeom>
-        </p:spPr>
-      </p:pic>
-      <p:pic>
-        <p:nvPicPr>
-          <p:cNvPr id="3" name="Image 1" descr="preencoded.png"/>
-          <p:cNvPicPr>
-            <a:picLocks noChangeAspect="1"/>
-          </p:cNvPicPr>
-          <p:nvPr/>
-        </p:nvPicPr>
-        <p:blipFill>
-          <a:blip r:embed="rId4"/>
-          <a:stretch>
-            <a:fillRect/>
-          </a:stretch>
-        </p:blipFill>
-        <p:spPr>
-          <a:xfrm>
-            <a:off x="0" y="0"/>
-            <a:ext cx="12192000" cy="304800"/>
-          </a:xfrm>
-          <a:prstGeom prst="rect">
-            <a:avLst/>
-          </a:prstGeom>
-        </p:spPr>
-      </p:pic>
-      <p:pic>
-        <p:nvPicPr>
-          <p:cNvPr id="4" name="Image 2" descr="preencoded.png"/>
-          <p:cNvPicPr>
-            <a:picLocks noChangeAspect="1"/>
-          </p:cNvPicPr>
-          <p:nvPr/>
-        </p:nvPicPr>
-        <p:blipFill>
-          <a:blip r:embed="rId5"/>
-          <a:stretch>
-            <a:fillRect/>
-          </a:stretch>
-        </p:blipFill>
-        <p:spPr>
-          <a:xfrm>
-            <a:off x="11410950" y="47625"/>
-            <a:ext cx="209550" cy="209550"/>
-          </a:xfrm>
-          <a:prstGeom prst="rect">
-            <a:avLst/>
-          </a:prstGeom>
-        </p:spPr>
-      </p:pic>
-      <p:pic>
-        <p:nvPicPr>
-          <p:cNvPr id="5" name="Image 3" descr="preencoded.png"/>
-          <p:cNvPicPr>
-            <a:picLocks noChangeAspect="1"/>
-          </p:cNvPicPr>
-          <p:nvPr/>
-        </p:nvPicPr>
-        <p:blipFill>
-          <a:blip r:embed="rId5"/>
-          <a:stretch>
-            <a:fillRect/>
-          </a:stretch>
-        </p:blipFill>
-        <p:spPr>
-          <a:xfrm>
-            <a:off x="11658600" y="47625"/>
-            <a:ext cx="209550" cy="209550"/>
-          </a:xfrm>
-          <a:prstGeom prst="rect">
-            <a:avLst/>
-          </a:prstGeom>
-        </p:spPr>
-      </p:pic>
-      <p:pic>
-        <p:nvPicPr>
-          <p:cNvPr id="6" name="Image 4" descr="preencoded.png"/>
-          <p:cNvPicPr>
-            <a:picLocks noChangeAspect="1"/>
-          </p:cNvPicPr>
-          <p:nvPr/>
-        </p:nvPicPr>
-        <p:blipFill>
-          <a:blip r:embed="rId5"/>
-          <a:stretch>
-            <a:fillRect/>
-          </a:stretch>
-        </p:blipFill>
-        <p:spPr>
-          <a:xfrm>
-            <a:off x="11906250" y="47625"/>
-            <a:ext cx="209550" cy="209550"/>
-          </a:xfrm>
-          <a:prstGeom prst="rect">
-            <a:avLst/>
-          </a:prstGeom>
-        </p:spPr>
-      </p:pic>
-      <p:pic>
-        <p:nvPicPr>
-          <p:cNvPr id="7" name="Image 5" descr="preencoded.png"/>
-          <p:cNvPicPr>
-            <a:picLocks noChangeAspect="1"/>
-          </p:cNvPicPr>
-          <p:nvPr/>
-        </p:nvPicPr>
-        <p:blipFill>
-          <a:blip r:embed="rId6"/>
-          <a:stretch>
-            <a:fillRect/>
-          </a:stretch>
-        </p:blipFill>
-        <p:spPr>
-          <a:xfrm>
-            <a:off x="190500" y="1085850"/>
-            <a:ext cx="11811000" cy="800100"/>
-          </a:xfrm>
-          <a:prstGeom prst="rect">
-            <a:avLst/>
-          </a:prstGeom>
-        </p:spPr>
-      </p:pic>
-      <p:pic>
-        <p:nvPicPr>
-          <p:cNvPr id="8" name="Image 6" descr="preencoded.png"/>
-          <p:cNvPicPr>
-            <a:picLocks noChangeAspect="1"/>
-          </p:cNvPicPr>
-          <p:nvPr/>
-        </p:nvPicPr>
-        <p:blipFill>
-          <a:blip r:embed="rId7"/>
-          <a:stretch>
-            <a:fillRect/>
-          </a:stretch>
-        </p:blipFill>
-        <p:spPr>
-          <a:xfrm>
-            <a:off x="376238" y="1304925"/>
-            <a:ext cx="390525" cy="342900"/>
-          </a:xfrm>
-          <a:prstGeom prst="rect">
-            <a:avLst/>
-          </a:prstGeom>
-        </p:spPr>
-      </p:pic>
-      <p:pic>
-        <p:nvPicPr>
-          <p:cNvPr id="9" name="Image 7" descr="preencoded.png"/>
-          <p:cNvPicPr>
-            <a:picLocks noChangeAspect="1"/>
-          </p:cNvPicPr>
-          <p:nvPr/>
-        </p:nvPicPr>
-        <p:blipFill>
-          <a:blip r:embed="rId6"/>
-          <a:stretch>
-            <a:fillRect/>
-          </a:stretch>
-        </p:blipFill>
-        <p:spPr>
-          <a:xfrm>
-            <a:off x="190500" y="2076450"/>
-            <a:ext cx="11811000" cy="800100"/>
-          </a:xfrm>
-          <a:prstGeom prst="rect">
-            <a:avLst/>
-          </a:prstGeom>
-        </p:spPr>
-      </p:pic>
-      <p:pic>
-        <p:nvPicPr>
-          <p:cNvPr id="10" name="Image 8" descr="preencoded.png"/>
-          <p:cNvPicPr>
-            <a:picLocks noChangeAspect="1"/>
-          </p:cNvPicPr>
-          <p:nvPr/>
-        </p:nvPicPr>
-        <p:blipFill>
-          <a:blip r:embed="rId8"/>
-          <a:stretch>
-            <a:fillRect/>
-          </a:stretch>
-        </p:blipFill>
-        <p:spPr>
-          <a:xfrm>
-            <a:off x="376238" y="2295525"/>
-            <a:ext cx="390525" cy="342900"/>
-          </a:xfrm>
-          <a:prstGeom prst="rect">
-            <a:avLst/>
-          </a:prstGeom>
-        </p:spPr>
-      </p:pic>
-      <p:pic>
-        <p:nvPicPr>
-          <p:cNvPr id="11" name="Image 9" descr="preencoded.png"/>
-          <p:cNvPicPr>
-            <a:picLocks noChangeAspect="1"/>
-          </p:cNvPicPr>
-          <p:nvPr/>
-        </p:nvPicPr>
-        <p:blipFill>
-          <a:blip r:embed="rId6"/>
-          <a:stretch>
-            <a:fillRect/>
-          </a:stretch>
-        </p:blipFill>
-        <p:spPr>
-          <a:xfrm>
-            <a:off x="190500" y="3067050"/>
-            <a:ext cx="11811000" cy="800100"/>
-          </a:xfrm>
-          <a:prstGeom prst="rect">
-            <a:avLst/>
-          </a:prstGeom>
-        </p:spPr>
-      </p:pic>
-      <p:pic>
-        <p:nvPicPr>
-          <p:cNvPr id="12" name="Image 10" descr="preencoded.png"/>
-          <p:cNvPicPr>
-            <a:picLocks noChangeAspect="1"/>
-          </p:cNvPicPr>
-          <p:nvPr/>
-        </p:nvPicPr>
-        <p:blipFill>
-          <a:blip r:embed="rId9"/>
-          <a:stretch>
-            <a:fillRect/>
-          </a:stretch>
-        </p:blipFill>
-        <p:spPr>
-          <a:xfrm>
-            <a:off x="357188" y="3286125"/>
-            <a:ext cx="428625" cy="342900"/>
-          </a:xfrm>
-          <a:prstGeom prst="rect">
-            <a:avLst/>
-          </a:prstGeom>
-        </p:spPr>
-      </p:pic>
-      <p:pic>
-        <p:nvPicPr>
-          <p:cNvPr id="13" name="Image 11" descr="preencoded.png"/>
-          <p:cNvPicPr>
-            <a:picLocks noChangeAspect="1"/>
-          </p:cNvPicPr>
-          <p:nvPr/>
-        </p:nvPicPr>
-        <p:blipFill>
-          <a:blip r:embed="rId6"/>
-          <a:stretch>
-            <a:fillRect/>
-          </a:stretch>
-        </p:blipFill>
-        <p:spPr>
-          <a:xfrm>
-            <a:off x="190500" y="4057650"/>
-            <a:ext cx="11811000" cy="800100"/>
-          </a:xfrm>
-          <a:prstGeom prst="rect">
-            <a:avLst/>
-          </a:prstGeom>
-        </p:spPr>
-      </p:pic>
-      <p:pic>
-        <p:nvPicPr>
-          <p:cNvPr id="14" name="Image 12" descr="preencoded.png"/>
-          <p:cNvPicPr>
-            <a:picLocks noChangeAspect="1"/>
-          </p:cNvPicPr>
-          <p:nvPr/>
-        </p:nvPicPr>
-        <p:blipFill>
-          <a:blip r:embed="rId10"/>
-          <a:stretch>
-            <a:fillRect/>
-          </a:stretch>
-        </p:blipFill>
-        <p:spPr>
-          <a:xfrm>
-            <a:off x="400050" y="4276725"/>
-            <a:ext cx="342900" cy="342900"/>
-          </a:xfrm>
-          <a:prstGeom prst="rect">
-            <a:avLst/>
-          </a:prstGeom>
-        </p:spPr>
-      </p:pic>
-      <p:pic>
-        <p:nvPicPr>
-          <p:cNvPr id="15" name="Image 13" descr="preencoded.png"/>
-          <p:cNvPicPr>
-            <a:picLocks noChangeAspect="1"/>
-          </p:cNvPicPr>
-          <p:nvPr/>
-        </p:nvPicPr>
-        <p:blipFill>
-          <a:blip r:embed="rId11"/>
-          <a:stretch>
-            <a:fillRect/>
-          </a:stretch>
-        </p:blipFill>
-        <p:spPr>
-          <a:xfrm>
-            <a:off x="190500" y="5143500"/>
-            <a:ext cx="11811000" cy="533400"/>
-          </a:xfrm>
-          <a:prstGeom prst="rect">
-            <a:avLst/>
-          </a:prstGeom>
-        </p:spPr>
-      </p:pic>
-      <p:pic>
-        <p:nvPicPr>
-          <p:cNvPr id="16" name="Image 14" descr="preencoded.png"/>
-          <p:cNvPicPr>
-            <a:picLocks noChangeAspect="1"/>
-          </p:cNvPicPr>
-          <p:nvPr/>
-        </p:nvPicPr>
-        <p:blipFill>
-          <a:blip r:embed="rId12"/>
-          <a:stretch>
-            <a:fillRect/>
-          </a:stretch>
-        </p:blipFill>
-        <p:spPr>
-          <a:xfrm>
-            <a:off x="9144000" y="5086350"/>
-            <a:ext cx="2857500" cy="1581150"/>
-          </a:xfrm>
-          <a:prstGeom prst="rect">
-            <a:avLst/>
-          </a:prstGeom>
-        </p:spPr>
-      </p:pic>
-      <p:pic>
-        <p:nvPicPr>
-          <p:cNvPr id="17" name="Image 15" descr="preencoded.png"/>
-          <p:cNvPicPr>
-            <a:picLocks noChangeAspect="1"/>
-          </p:cNvPicPr>
-          <p:nvPr/>
-        </p:nvPicPr>
-        <p:blipFill>
-          <a:blip r:embed="rId13"/>
-          <a:stretch>
-            <a:fillRect/>
-          </a:stretch>
-        </p:blipFill>
-        <p:spPr>
-          <a:xfrm>
-            <a:off x="9239250" y="5181600"/>
-            <a:ext cx="2667000" cy="276225"/>
-          </a:xfrm>
-          <a:prstGeom prst="rect">
-            <a:avLst/>
-          </a:prstGeom>
-        </p:spPr>
-      </p:pic>
-      <p:pic>
-        <p:nvPicPr>
-          <p:cNvPr id="18" name="Image 16" descr="preencoded.png"/>
-          <p:cNvPicPr>
-            <a:picLocks noChangeAspect="1"/>
-          </p:cNvPicPr>
-          <p:nvPr/>
-        </p:nvPicPr>
-        <p:blipFill>
-          <a:blip r:embed="rId14"/>
-          <a:stretch>
-            <a:fillRect/>
-          </a:stretch>
-        </p:blipFill>
-        <p:spPr>
-          <a:xfrm>
-            <a:off x="10363200" y="6248400"/>
-            <a:ext cx="419100" cy="323850"/>
-          </a:xfrm>
-          <a:prstGeom prst="rect">
-            <a:avLst/>
-          </a:prstGeom>
-        </p:spPr>
-      </p:pic>
-      <p:sp>
-        <p:nvSpPr>
-          <p:cNvPr id="19" name="Text 0"/>
-          <p:cNvSpPr/>
-          <p:nvPr/>
-        </p:nvSpPr>
-        <p:spPr>
-          <a:xfrm>
-            <a:off x="76200" y="38100"/>
-            <a:ext cx="1646634" cy="228600"/>
-          </a:xfrm>
-          <a:prstGeom prst="rect">
-            <a:avLst/>
-          </a:prstGeom>
-          <a:noFill/>
-          <a:ln/>
-        </p:spPr>
-        <p:txBody>
-          <a:bodyPr vert="horz" wrap="square" lIns="0" tIns="0" rIns="0" bIns="0" rtlCol="0" anchor="t"/>
-          <a:lstStyle/>
-          <a:p>
-            <a:pPr marL="0" indent="0">
-              <a:lnSpc>
-                <a:spcPts val="1800"/>
-              </a:lnSpc>
-              <a:buNone/>
-            </a:pPr>
-            <a:r>
-              <a:rPr lang="en-US" sz="1200" dirty="0">
-                <a:solidFill>
-                  <a:srgbClr val="FFFFFF"/>
-                </a:solidFill>
-                <a:latin typeface="MS Sans Serif" pitchFamily="34" charset="0"/>
-                <a:ea typeface="MS Sans Serif" pitchFamily="34" charset="-122"/>
-                <a:cs typeface="MS Sans Serif" pitchFamily="34" charset="-120"/>
-              </a:rPr>
-              <a:t>Problema - OldBank</a:t>
-            </a:r>
-            <a:endParaRPr lang="en-US" sz="1200" dirty="0"/>
-          </a:p>
-        </p:txBody>
-      </p:sp>
-      <p:sp>
-        <p:nvSpPr>
-          <p:cNvPr id="20" name="Text 1"/>
-          <p:cNvSpPr/>
-          <p:nvPr/>
-        </p:nvSpPr>
-        <p:spPr>
-          <a:xfrm>
-            <a:off x="11473309" y="47625"/>
-            <a:ext cx="209550" cy="209550"/>
-          </a:xfrm>
-          <a:prstGeom prst="rect">
-            <a:avLst/>
-          </a:prstGeom>
-          <a:noFill/>
-          <a:ln/>
-        </p:spPr>
-        <p:txBody>
-          <a:bodyPr vert="horz" wrap="square" lIns="0" tIns="0" rIns="0" bIns="0" rtlCol="0" anchor="t"/>
-          <a:lstStyle/>
-          <a:p>
-            <a:pPr marL="0" indent="0">
-              <a:lnSpc>
-                <a:spcPts val="1800"/>
-              </a:lnSpc>
-              <a:buNone/>
-            </a:pPr>
-            <a:r>
-              <a:rPr lang="en-US" sz="1200" b="1" dirty="0">
-                <a:solidFill>
-                  <a:srgbClr val="FFFFFF"/>
-                </a:solidFill>
-                <a:latin typeface="MS Sans Serif" pitchFamily="34" charset="0"/>
-                <a:ea typeface="MS Sans Serif" pitchFamily="34" charset="-122"/>
-                <a:cs typeface="MS Sans Serif" pitchFamily="34" charset="-120"/>
-              </a:rPr>
-              <a:t>_</a:t>
-            </a:r>
-            <a:endParaRPr lang="en-US" sz="1200" dirty="0"/>
-          </a:p>
-        </p:txBody>
-      </p:sp>
-      <p:sp>
-        <p:nvSpPr>
-          <p:cNvPr id="21" name="Text 2"/>
-          <p:cNvSpPr/>
-          <p:nvPr/>
-        </p:nvSpPr>
-        <p:spPr>
-          <a:xfrm>
-            <a:off x="11717238" y="47625"/>
-            <a:ext cx="209550" cy="209550"/>
-          </a:xfrm>
-          <a:prstGeom prst="rect">
-            <a:avLst/>
-          </a:prstGeom>
-          <a:noFill/>
-          <a:ln/>
-        </p:spPr>
-        <p:txBody>
-          <a:bodyPr vert="horz" wrap="square" lIns="0" tIns="0" rIns="0" bIns="0" rtlCol="0" anchor="t"/>
-          <a:lstStyle/>
-          <a:p>
-            <a:pPr marL="0" indent="0">
-              <a:lnSpc>
-                <a:spcPts val="1800"/>
-              </a:lnSpc>
-              <a:buNone/>
-            </a:pPr>
-            <a:r>
-              <a:rPr lang="en-US" sz="1200" b="1" dirty="0">
-                <a:solidFill>
-                  <a:srgbClr val="FFFFFF"/>
-                </a:solidFill>
-                <a:latin typeface="MS Sans Serif" pitchFamily="34" charset="0"/>
-                <a:ea typeface="MS Sans Serif" pitchFamily="34" charset="-122"/>
-                <a:cs typeface="MS Sans Serif" pitchFamily="34" charset="-120"/>
-              </a:rPr>
-              <a:t>□</a:t>
-            </a:r>
-            <a:endParaRPr lang="en-US" sz="1200" dirty="0"/>
-          </a:p>
-        </p:txBody>
-      </p:sp>
-      <p:sp>
-        <p:nvSpPr>
-          <p:cNvPr id="22" name="Text 3"/>
-          <p:cNvSpPr/>
-          <p:nvPr/>
-        </p:nvSpPr>
-        <p:spPr>
-          <a:xfrm>
-            <a:off x="11966525" y="47625"/>
-            <a:ext cx="209550" cy="209550"/>
-          </a:xfrm>
-          <a:prstGeom prst="rect">
-            <a:avLst/>
-          </a:prstGeom>
-          <a:noFill/>
-          <a:ln/>
-        </p:spPr>
-        <p:txBody>
-          <a:bodyPr vert="horz" wrap="square" lIns="0" tIns="0" rIns="0" bIns="0" rtlCol="0" anchor="t"/>
-          <a:lstStyle/>
-          <a:p>
-            <a:pPr marL="0" indent="0">
-              <a:lnSpc>
-                <a:spcPts val="1800"/>
-              </a:lnSpc>
-              <a:buNone/>
-            </a:pPr>
-            <a:r>
-              <a:rPr lang="en-US" sz="1200" b="1" dirty="0">
-                <a:solidFill>
-                  <a:srgbClr val="FFFFFF"/>
-                </a:solidFill>
-                <a:latin typeface="MS Sans Serif" pitchFamily="34" charset="0"/>
-                <a:ea typeface="MS Sans Serif" pitchFamily="34" charset="-122"/>
-                <a:cs typeface="MS Sans Serif" pitchFamily="34" charset="-120"/>
-              </a:rPr>
-              <a:t>×</a:t>
-            </a:r>
-            <a:endParaRPr lang="en-US" sz="1200" dirty="0"/>
-          </a:p>
-        </p:txBody>
-      </p:sp>
-      <p:sp>
-        <p:nvSpPr>
-          <p:cNvPr id="23" name="Text 4"/>
-          <p:cNvSpPr/>
-          <p:nvPr/>
-        </p:nvSpPr>
-        <p:spPr>
-          <a:xfrm>
-            <a:off x="190500" y="495300"/>
-            <a:ext cx="11811000" cy="400050"/>
-          </a:xfrm>
-          <a:prstGeom prst="rect">
-            <a:avLst/>
-          </a:prstGeom>
-          <a:noFill/>
-          <a:ln/>
-        </p:spPr>
-        <p:txBody>
-          <a:bodyPr vert="horz" wrap="square" lIns="0" tIns="0" rIns="0" bIns="0" rtlCol="0" anchor="t"/>
-          <a:lstStyle/>
-          <a:p>
-            <a:pPr marL="0" indent="0" algn="ctr">
-              <a:lnSpc>
-                <a:spcPts val="3150"/>
-              </a:lnSpc>
-              <a:buNone/>
-            </a:pPr>
-            <a:r>
-              <a:rPr lang="en-US" sz="2100" b="1" dirty="0">
-                <a:solidFill>
-                  <a:srgbClr val="000080"/>
-                </a:solidFill>
-                <a:latin typeface="MS Sans Serif" pitchFamily="34" charset="0"/>
-                <a:ea typeface="MS Sans Serif" pitchFamily="34" charset="-122"/>
-                <a:cs typeface="MS Sans Serif" pitchFamily="34" charset="-120"/>
-              </a:rPr>
-              <a:t>De ce este necesară o soluție nouă?</a:t>
-            </a:r>
-            <a:endParaRPr lang="en-US" sz="2100" dirty="0"/>
-          </a:p>
-        </p:txBody>
-      </p:sp>
-      <p:sp>
-        <p:nvSpPr>
-          <p:cNvPr id="24" name="Text 5"/>
-          <p:cNvSpPr/>
-          <p:nvPr/>
-        </p:nvSpPr>
-        <p:spPr>
-          <a:xfrm>
-            <a:off x="1000125" y="1328738"/>
-            <a:ext cx="13030200" cy="314325"/>
-          </a:xfrm>
-          <a:prstGeom prst="rect">
-            <a:avLst/>
-          </a:prstGeom>
-          <a:noFill/>
-          <a:ln/>
-        </p:spPr>
-        <p:txBody>
-          <a:bodyPr vert="horz" wrap="square" lIns="0" tIns="0" rIns="0" bIns="0" rtlCol="0" anchor="t"/>
-          <a:lstStyle/>
-          <a:p>
-            <a:pPr marL="0" indent="0">
-              <a:lnSpc>
-                <a:spcPts val="2475"/>
-              </a:lnSpc>
-              <a:buNone/>
-            </a:pPr>
-            <a:r>
-              <a:rPr lang="en-US" sz="1650" dirty="0">
-                <a:solidFill>
-                  <a:srgbClr val="000000"/>
-                </a:solidFill>
-                <a:latin typeface="MS Sans Serif" pitchFamily="34" charset="0"/>
-                <a:ea typeface="MS Sans Serif" pitchFamily="34" charset="-122"/>
-                <a:cs typeface="MS Sans Serif" pitchFamily="34" charset="-120"/>
-              </a:rPr>
-              <a:t>Aplicațiile bancare moderne sunt adesea percepute ca fiind sterile și lipsite de personalitate</a:t>
-            </a:r>
-            <a:endParaRPr lang="en-US" sz="1650" dirty="0"/>
-          </a:p>
-        </p:txBody>
-      </p:sp>
-      <p:sp>
-        <p:nvSpPr>
-          <p:cNvPr id="25" name="Text 6"/>
-          <p:cNvSpPr/>
-          <p:nvPr/>
-        </p:nvSpPr>
-        <p:spPr>
-          <a:xfrm>
-            <a:off x="1000125" y="2319338"/>
-            <a:ext cx="13030200" cy="314325"/>
-          </a:xfrm>
-          <a:prstGeom prst="rect">
-            <a:avLst/>
-          </a:prstGeom>
-          <a:noFill/>
-          <a:ln/>
-        </p:spPr>
-        <p:txBody>
-          <a:bodyPr vert="horz" wrap="square" lIns="0" tIns="0" rIns="0" bIns="0" rtlCol="0" anchor="t"/>
-          <a:lstStyle/>
-          <a:p>
-            <a:pPr marL="0" indent="0">
-              <a:lnSpc>
-                <a:spcPts val="2475"/>
-              </a:lnSpc>
-              <a:buNone/>
-            </a:pPr>
-            <a:r>
-              <a:rPr lang="en-US" sz="1650" dirty="0">
-                <a:solidFill>
-                  <a:srgbClr val="000000"/>
-                </a:solidFill>
-                <a:latin typeface="MS Sans Serif" pitchFamily="34" charset="0"/>
-                <a:ea typeface="MS Sans Serif" pitchFamily="34" charset="-122"/>
-                <a:cs typeface="MS Sans Serif" pitchFamily="34" charset="-120"/>
-              </a:rPr>
-              <a:t>Interfețele corporatiste "flat design" nu oferă o experiență memorabilă sau plăcută</a:t>
-            </a:r>
-            <a:endParaRPr lang="en-US" sz="1650" dirty="0"/>
-          </a:p>
-        </p:txBody>
-      </p:sp>
-      <p:sp>
-        <p:nvSpPr>
-          <p:cNvPr id="26" name="Text 7"/>
-          <p:cNvSpPr/>
-          <p:nvPr/>
-        </p:nvSpPr>
-        <p:spPr>
-          <a:xfrm>
-            <a:off x="1000125" y="3309938"/>
-            <a:ext cx="13030200" cy="314325"/>
-          </a:xfrm>
-          <a:prstGeom prst="rect">
-            <a:avLst/>
-          </a:prstGeom>
-          <a:noFill/>
-          <a:ln/>
-        </p:spPr>
-        <p:txBody>
-          <a:bodyPr vert="horz" wrap="square" lIns="0" tIns="0" rIns="0" bIns="0" rtlCol="0" anchor="t"/>
-          <a:lstStyle/>
-          <a:p>
-            <a:pPr marL="0" indent="0">
-              <a:lnSpc>
-                <a:spcPts val="2475"/>
-              </a:lnSpc>
-              <a:buNone/>
-            </a:pPr>
-            <a:r>
-              <a:rPr lang="en-US" sz="1650" dirty="0">
-                <a:solidFill>
-                  <a:srgbClr val="000000"/>
-                </a:solidFill>
-                <a:latin typeface="MS Sans Serif" pitchFamily="34" charset="0"/>
-                <a:ea typeface="MS Sans Serif" pitchFamily="34" charset="-122"/>
-                <a:cs typeface="MS Sans Serif" pitchFamily="34" charset="-120"/>
-              </a:rPr>
-              <a:t>Utilizatorii se simt deconectați de interfețele impersonale și complexe</a:t>
-            </a:r>
-            <a:endParaRPr lang="en-US" sz="1650" dirty="0"/>
-          </a:p>
-        </p:txBody>
-      </p:sp>
-      <p:sp>
-        <p:nvSpPr>
-          <p:cNvPr id="27" name="Text 8"/>
-          <p:cNvSpPr/>
-          <p:nvPr/>
-        </p:nvSpPr>
-        <p:spPr>
-          <a:xfrm>
-            <a:off x="1000125" y="4300538"/>
-            <a:ext cx="13030200" cy="314325"/>
-          </a:xfrm>
-          <a:prstGeom prst="rect">
-            <a:avLst/>
-          </a:prstGeom>
-          <a:noFill/>
-          <a:ln/>
-        </p:spPr>
-        <p:txBody>
-          <a:bodyPr vert="horz" wrap="square" lIns="0" tIns="0" rIns="0" bIns="0" rtlCol="0" anchor="t"/>
-          <a:lstStyle/>
-          <a:p>
-            <a:pPr marL="0" indent="0">
-              <a:lnSpc>
-                <a:spcPts val="2475"/>
-              </a:lnSpc>
-              <a:buNone/>
-            </a:pPr>
-            <a:r>
-              <a:rPr lang="en-US" sz="1650" dirty="0">
-                <a:solidFill>
-                  <a:srgbClr val="000000"/>
-                </a:solidFill>
-                <a:latin typeface="MS Sans Serif" pitchFamily="34" charset="0"/>
-                <a:ea typeface="MS Sans Serif" pitchFamily="34" charset="-122"/>
-                <a:cs typeface="MS Sans Serif" pitchFamily="34" charset="-120"/>
-              </a:rPr>
-              <a:t>Ce-ar fi dacă banking-ul ar fi la fel de simplu și familiar ca Windows 98?</a:t>
-            </a:r>
-            <a:endParaRPr lang="en-US" sz="1650" dirty="0"/>
-          </a:p>
-        </p:txBody>
-      </p:sp>
-      <p:sp>
-        <p:nvSpPr>
-          <p:cNvPr id="28" name="Text 9"/>
-          <p:cNvSpPr/>
-          <p:nvPr/>
-        </p:nvSpPr>
-        <p:spPr>
-          <a:xfrm>
-            <a:off x="155525" y="5237783"/>
-            <a:ext cx="11811000" cy="533400"/>
-          </a:xfrm>
-          <a:prstGeom prst="rect">
-            <a:avLst/>
-          </a:prstGeom>
-          <a:noFill/>
-          <a:ln/>
-        </p:spPr>
-        <p:txBody>
-          <a:bodyPr vert="horz" wrap="square" lIns="0" tIns="0" rIns="0" bIns="0" rtlCol="0" anchor="t"/>
-          <a:lstStyle/>
-          <a:p>
-            <a:pPr marL="0" indent="0" algn="ctr">
-              <a:lnSpc>
-                <a:spcPts val="2700"/>
-              </a:lnSpc>
-              <a:buNone/>
-            </a:pPr>
-            <a:r>
-              <a:rPr lang="en-US" sz="1800" b="1" dirty="0">
-                <a:solidFill>
-                  <a:srgbClr val="000080"/>
-                </a:solidFill>
-                <a:latin typeface="MS Sans Serif" pitchFamily="34" charset="0"/>
-                <a:ea typeface="MS Sans Serif" pitchFamily="34" charset="-122"/>
-                <a:cs typeface="MS Sans Serif" pitchFamily="34" charset="-120"/>
-              </a:rPr>
-              <a:t>Ce soluție oferim noi?</a:t>
-            </a:r>
-            <a:endParaRPr lang="en-US" sz="1800" dirty="0"/>
-          </a:p>
-        </p:txBody>
-      </p:sp>
-      <p:sp>
-        <p:nvSpPr>
-          <p:cNvPr id="29" name="Text 10"/>
-          <p:cNvSpPr/>
-          <p:nvPr/>
-        </p:nvSpPr>
-        <p:spPr>
-          <a:xfrm>
-            <a:off x="9239250" y="5181600"/>
-            <a:ext cx="2667000" cy="276225"/>
-          </a:xfrm>
-          <a:prstGeom prst="rect">
-            <a:avLst/>
-          </a:prstGeom>
-          <a:noFill/>
-          <a:ln/>
-        </p:spPr>
-        <p:txBody>
-          <a:bodyPr vert="horz" wrap="square" lIns="0" tIns="0" rIns="0" bIns="0" rtlCol="0" anchor="t"/>
-          <a:lstStyle/>
-          <a:p>
-            <a:pPr marL="0" indent="0">
-              <a:lnSpc>
-                <a:spcPts val="1800"/>
-              </a:lnSpc>
-              <a:buNone/>
-            </a:pPr>
-            <a:r>
-              <a:rPr lang="en-US" sz="1200" b="1" dirty="0">
-                <a:solidFill>
-                  <a:srgbClr val="000080"/>
-                </a:solidFill>
-                <a:latin typeface="MS Sans Serif" pitchFamily="34" charset="0"/>
-                <a:ea typeface="MS Sans Serif" pitchFamily="34" charset="-122"/>
-                <a:cs typeface="MS Sans Serif" pitchFamily="34" charset="-120"/>
-              </a:rPr>
-              <a:t>Windows 98</a:t>
-            </a:r>
-            <a:endParaRPr lang="en-US" sz="1200" dirty="0"/>
-          </a:p>
-        </p:txBody>
-      </p:sp>
-      <p:sp>
-        <p:nvSpPr>
-          <p:cNvPr id="30" name="Text 11"/>
-          <p:cNvSpPr/>
-          <p:nvPr/>
-        </p:nvSpPr>
-        <p:spPr>
-          <a:xfrm>
-            <a:off x="9239250" y="5553075"/>
-            <a:ext cx="2667000" cy="600075"/>
-          </a:xfrm>
-          <a:prstGeom prst="rect">
-            <a:avLst/>
-          </a:prstGeom>
-          <a:noFill/>
-          <a:ln/>
-        </p:spPr>
-        <p:txBody>
-          <a:bodyPr vert="horz" wrap="square" lIns="0" tIns="0" rIns="0" bIns="0" rtlCol="0" anchor="t"/>
-          <a:lstStyle/>
-          <a:p>
-            <a:pPr marL="0" indent="0">
-              <a:lnSpc>
-                <a:spcPts val="1575"/>
-              </a:lnSpc>
-              <a:buNone/>
-            </a:pPr>
-            <a:r>
-              <a:rPr lang="en-US" sz="1050" dirty="0">
-                <a:solidFill>
-                  <a:srgbClr val="000000"/>
-                </a:solidFill>
-                <a:latin typeface="MS Sans Serif" pitchFamily="34" charset="0"/>
-                <a:ea typeface="MS Sans Serif" pitchFamily="34" charset="-122"/>
-                <a:cs typeface="MS Sans Serif" pitchFamily="34" charset="-120"/>
-              </a:rPr>
-              <a:t>Eroare: Nu s-a putut conecta la serviciul bancar modern. Vă rugăm să încercați mai târziu.</a:t>
-            </a:r>
-            <a:endParaRPr lang="en-US" sz="1050" dirty="0"/>
-          </a:p>
-        </p:txBody>
-      </p:sp>
-      <p:sp>
-        <p:nvSpPr>
-          <p:cNvPr id="31" name="Text 12"/>
-          <p:cNvSpPr/>
-          <p:nvPr/>
-        </p:nvSpPr>
-        <p:spPr>
-          <a:xfrm>
-            <a:off x="10458450" y="6248400"/>
-            <a:ext cx="419100" cy="323850"/>
-          </a:xfrm>
-          <a:prstGeom prst="rect">
-            <a:avLst/>
-          </a:prstGeom>
-          <a:noFill/>
-          <a:ln/>
-        </p:spPr>
-        <p:txBody>
-          <a:bodyPr vert="horz" wrap="square" lIns="0" tIns="0" rIns="0" bIns="0" rtlCol="0" anchor="t"/>
-          <a:lstStyle/>
-          <a:p>
-            <a:pPr marL="0" indent="0">
-              <a:lnSpc>
-                <a:spcPts val="1800"/>
-              </a:lnSpc>
-              <a:buNone/>
-            </a:pPr>
-            <a:r>
-              <a:rPr lang="en-US" sz="1200" b="1" dirty="0">
-                <a:solidFill>
-                  <a:srgbClr val="000000"/>
-                </a:solidFill>
-                <a:latin typeface="MS Sans Serif" pitchFamily="34" charset="0"/>
-                <a:ea typeface="MS Sans Serif" pitchFamily="34" charset="-122"/>
-                <a:cs typeface="MS Sans Serif" pitchFamily="34" charset="-120"/>
-              </a:rPr>
-              <a:t>OK</a:t>
-            </a:r>
-            <a:endParaRPr lang="en-US" sz="1200" dirty="0"/>
-          </a:p>
-        </p:txBody>
-      </p:sp>
-      <p:sp>
-        <p:nvSpPr>
-          <p:cNvPr id="33" name="TextBox 32">
-            <a:extLst>
-              <a:ext uri="{FF2B5EF4-FFF2-40B4-BE49-F238E27FC236}">
-                <a16:creationId xmlns:a16="http://schemas.microsoft.com/office/drawing/2014/main" id="{E25E312B-33B5-35F8-0DD8-7FF49796C87A}"/>
-              </a:ext>
-            </a:extLst>
-          </p:cNvPr>
-          <p:cNvSpPr txBox="1"/>
-          <p:nvPr/>
-        </p:nvSpPr>
-        <p:spPr>
-          <a:xfrm>
-            <a:off x="190502" y="6054600"/>
-            <a:ext cx="2034399" cy="307777"/>
-          </a:xfrm>
-          <a:prstGeom prst="rect">
-            <a:avLst/>
-          </a:prstGeom>
-          <a:noFill/>
-        </p:spPr>
-        <p:txBody>
-          <a:bodyPr wrap="square" rtlCol="0">
-            <a:spAutoFit/>
-          </a:bodyPr>
-          <a:lstStyle/>
-          <a:p>
-            <a:r>
-              <a:rPr lang="en-US" sz="1400" b="1" dirty="0">
-                <a:latin typeface="Courier New" panose="02070309020205020404" pitchFamily="49" charset="0"/>
-                <a:cs typeface="Courier New" panose="02070309020205020404" pitchFamily="49" charset="0"/>
-              </a:rPr>
-              <a:t>Activate Windows</a:t>
-            </a:r>
-            <a:endParaRPr lang="en-GB" sz="1400" b="1" dirty="0">
-              <a:latin typeface="Courier New" panose="02070309020205020404" pitchFamily="49" charset="0"/>
-              <a:cs typeface="Courier New" panose="02070309020205020404" pitchFamily="49" charset="0"/>
-            </a:endParaRPr>
-          </a:p>
-        </p:txBody>
-      </p:sp>
-      <p:sp>
-        <p:nvSpPr>
-          <p:cNvPr id="34" name="TextBox 33">
-            <a:extLst>
-              <a:ext uri="{FF2B5EF4-FFF2-40B4-BE49-F238E27FC236}">
-                <a16:creationId xmlns:a16="http://schemas.microsoft.com/office/drawing/2014/main" id="{6450000B-4726-3350-82EF-B0C1845F1651}"/>
-              </a:ext>
-            </a:extLst>
-          </p:cNvPr>
-          <p:cNvSpPr txBox="1"/>
-          <p:nvPr/>
-        </p:nvSpPr>
-        <p:spPr>
-          <a:xfrm>
-            <a:off x="190500" y="6275289"/>
-            <a:ext cx="3886978" cy="307777"/>
-          </a:xfrm>
-          <a:prstGeom prst="rect">
-            <a:avLst/>
-          </a:prstGeom>
-          <a:noFill/>
-        </p:spPr>
-        <p:txBody>
-          <a:bodyPr wrap="square" rtlCol="0">
-            <a:spAutoFit/>
-          </a:bodyPr>
-          <a:lstStyle/>
-          <a:p>
-            <a:r>
-              <a:rPr lang="en-US" sz="1400" b="1" dirty="0">
-                <a:latin typeface="Courier New" panose="02070309020205020404" pitchFamily="49" charset="0"/>
-                <a:cs typeface="Courier New" panose="02070309020205020404" pitchFamily="49" charset="0"/>
-              </a:rPr>
-              <a:t>Go to settings to Activate Windows</a:t>
-            </a:r>
-            <a:endParaRPr lang="en-GB" sz="1400" b="1" dirty="0">
-              <a:latin typeface="Courier New" panose="02070309020205020404" pitchFamily="49" charset="0"/>
-              <a:cs typeface="Courier New" panose="02070309020205020404" pitchFamily="49" charset="0"/>
-            </a:endParaRPr>
-          </a:p>
-        </p:txBody>
-      </p:sp>
-    </p:spTree>
-  </p:cSld>
-  <p:clrMapOvr>
-    <a:masterClrMapping/>
-  </p:clrMapOvr>
-</p:sld>
-</file>
-
-<file path=ppt/slides/slide3.xml><?xml version="1.0" encoding="utf-8"?>
-<p:sld xmlns:a="http://schemas.openxmlformats.org/drawingml/2006/main" xmlns:r="http://schemas.openxmlformats.org/officeDocument/2006/relationships" xmlns:p="http://schemas.openxmlformats.org/presentationml/2006/main">
   <p:cSld name="Slide 3">
     <p:spTree>
       <p:nvGrpSpPr>
@@ -4169,7 +3022,7 @@
 </p:sld>
 </file>
 
-<file path=ppt/slides/slide4.xml><?xml version="1.0" encoding="utf-8"?>
+<file path=ppt/slides/slide3.xml><?xml version="1.0" encoding="utf-8"?>
 <p:sld xmlns:a="http://schemas.openxmlformats.org/drawingml/2006/main" xmlns:r="http://schemas.openxmlformats.org/officeDocument/2006/relationships" xmlns:p="http://schemas.openxmlformats.org/presentationml/2006/main">
   <p:cSld name="Slide 4">
     <p:spTree>
@@ -5799,7 +4652,7 @@
 </p:sld>
 </file>
 
-<file path=ppt/slides/slide5.xml><?xml version="1.0" encoding="utf-8"?>
+<file path=ppt/slides/slide4.xml><?xml version="1.0" encoding="utf-8"?>
 <p:sld xmlns:a="http://schemas.openxmlformats.org/drawingml/2006/main" xmlns:r="http://schemas.openxmlformats.org/officeDocument/2006/relationships" xmlns:p="http://schemas.openxmlformats.org/presentationml/2006/main">
   <p:cSld name="Slide 5">
     <p:spTree>
@@ -5818,7 +4671,7 @@
       </p:grpSpPr>
       <p:pic>
         <p:nvPicPr>
-          <p:cNvPr id="2" name="Image 0" descr="preencoded.png"/>
+          <p:cNvPr id="3" name="Image 1" descr="preencoded.png"/>
           <p:cNvPicPr>
             <a:picLocks noChangeAspect="1"/>
           </p:cNvPicPr>
@@ -5826,30 +4679,6 @@
         </p:nvPicPr>
         <p:blipFill>
           <a:blip r:embed="rId3"/>
-          <a:stretch>
-            <a:fillRect/>
-          </a:stretch>
-        </p:blipFill>
-        <p:spPr>
-          <a:xfrm>
-            <a:off x="0" y="0"/>
-            <a:ext cx="12192000" cy="6858000"/>
-          </a:xfrm>
-          <a:prstGeom prst="rect">
-            <a:avLst/>
-          </a:prstGeom>
-        </p:spPr>
-      </p:pic>
-      <p:pic>
-        <p:nvPicPr>
-          <p:cNvPr id="3" name="Image 1" descr="preencoded.png"/>
-          <p:cNvPicPr>
-            <a:picLocks noChangeAspect="1"/>
-          </p:cNvPicPr>
-          <p:nvPr/>
-        </p:nvPicPr>
-        <p:blipFill>
-          <a:blip r:embed="rId4"/>
           <a:stretch>
             <a:fillRect/>
           </a:stretch>
@@ -5873,7 +4702,7 @@
           <p:nvPr/>
         </p:nvPicPr>
         <p:blipFill>
-          <a:blip r:embed="rId5"/>
+          <a:blip r:embed="rId4"/>
           <a:stretch>
             <a:fillRect/>
           </a:stretch>
@@ -5897,7 +4726,7 @@
           <p:nvPr/>
         </p:nvPicPr>
         <p:blipFill>
-          <a:blip r:embed="rId5"/>
+          <a:blip r:embed="rId4"/>
           <a:stretch>
             <a:fillRect/>
           </a:stretch>
@@ -5921,7 +4750,7 @@
           <p:nvPr/>
         </p:nvPicPr>
         <p:blipFill>
-          <a:blip r:embed="rId5"/>
+          <a:blip r:embed="rId4"/>
           <a:stretch>
             <a:fillRect/>
           </a:stretch>
@@ -5945,7 +4774,7 @@
           <p:nvPr/>
         </p:nvPicPr>
         <p:blipFill>
-          <a:blip r:embed="rId6"/>
+          <a:blip r:embed="rId5"/>
           <a:stretch>
             <a:fillRect/>
           </a:stretch>
@@ -5969,7 +4798,7 @@
           <p:nvPr/>
         </p:nvPicPr>
         <p:blipFill>
-          <a:blip r:embed="rId7"/>
+          <a:blip r:embed="rId6"/>
           <a:stretch>
             <a:fillRect/>
           </a:stretch>
@@ -5993,7 +4822,7 @@
           <p:nvPr/>
         </p:nvPicPr>
         <p:blipFill>
-          <a:blip r:embed="rId8"/>
+          <a:blip r:embed="rId7"/>
           <a:stretch>
             <a:fillRect/>
           </a:stretch>
@@ -6017,7 +4846,7 @@
           <p:nvPr/>
         </p:nvPicPr>
         <p:blipFill>
-          <a:blip r:embed="rId8"/>
+          <a:blip r:embed="rId7"/>
           <a:stretch>
             <a:fillRect/>
           </a:stretch>
@@ -6041,7 +4870,7 @@
           <p:nvPr/>
         </p:nvPicPr>
         <p:blipFill>
-          <a:blip r:embed="rId9"/>
+          <a:blip r:embed="rId8"/>
           <a:stretch>
             <a:fillRect/>
           </a:stretch>
@@ -6065,7 +4894,7 @@
           <p:nvPr/>
         </p:nvPicPr>
         <p:blipFill>
-          <a:blip r:embed="rId10"/>
+          <a:blip r:embed="rId9"/>
           <a:stretch>
             <a:fillRect/>
           </a:stretch>
@@ -6089,7 +4918,7 @@
           <p:nvPr/>
         </p:nvPicPr>
         <p:blipFill>
-          <a:blip r:embed="rId8"/>
+          <a:blip r:embed="rId7"/>
           <a:stretch>
             <a:fillRect/>
           </a:stretch>
@@ -6113,7 +4942,7 @@
           <p:nvPr/>
         </p:nvPicPr>
         <p:blipFill>
-          <a:blip r:embed="rId8"/>
+          <a:blip r:embed="rId7"/>
           <a:stretch>
             <a:fillRect/>
           </a:stretch>
@@ -6137,7 +4966,7 @@
           <p:nvPr/>
         </p:nvPicPr>
         <p:blipFill>
-          <a:blip r:embed="rId11"/>
+          <a:blip r:embed="rId10"/>
           <a:stretch>
             <a:fillRect/>
           </a:stretch>
@@ -6161,7 +4990,7 @@
           <p:nvPr/>
         </p:nvPicPr>
         <p:blipFill>
-          <a:blip r:embed="rId12"/>
+          <a:blip r:embed="rId11"/>
           <a:stretch>
             <a:fillRect/>
           </a:stretch>
@@ -6185,7 +5014,7 @@
           <p:nvPr/>
         </p:nvPicPr>
         <p:blipFill>
-          <a:blip r:embed="rId8"/>
+          <a:blip r:embed="rId7"/>
           <a:stretch>
             <a:fillRect/>
           </a:stretch>
@@ -6209,7 +5038,7 @@
           <p:nvPr/>
         </p:nvPicPr>
         <p:blipFill>
-          <a:blip r:embed="rId8"/>
+          <a:blip r:embed="rId7"/>
           <a:stretch>
             <a:fillRect/>
           </a:stretch>
@@ -6233,7 +5062,7 @@
           <p:nvPr/>
         </p:nvPicPr>
         <p:blipFill>
-          <a:blip r:embed="rId6"/>
+          <a:blip r:embed="rId5"/>
           <a:stretch>
             <a:fillRect/>
           </a:stretch>
@@ -6257,7 +5086,7 @@
           <p:nvPr/>
         </p:nvPicPr>
         <p:blipFill>
-          <a:blip r:embed="rId13"/>
+          <a:blip r:embed="rId12"/>
           <a:stretch>
             <a:fillRect/>
           </a:stretch>
@@ -6281,7 +5110,7 @@
           <p:nvPr/>
         </p:nvPicPr>
         <p:blipFill>
-          <a:blip r:embed="rId8"/>
+          <a:blip r:embed="rId7"/>
           <a:stretch>
             <a:fillRect/>
           </a:stretch>
@@ -6305,7 +5134,7 @@
           <p:nvPr/>
         </p:nvPicPr>
         <p:blipFill>
-          <a:blip r:embed="rId8"/>
+          <a:blip r:embed="rId7"/>
           <a:stretch>
             <a:fillRect/>
           </a:stretch>
@@ -6329,7 +5158,7 @@
           <p:nvPr/>
         </p:nvPicPr>
         <p:blipFill>
-          <a:blip r:embed="rId9"/>
+          <a:blip r:embed="rId8"/>
           <a:stretch>
             <a:fillRect/>
           </a:stretch>
@@ -6353,7 +5182,7 @@
           <p:nvPr/>
         </p:nvPicPr>
         <p:blipFill>
-          <a:blip r:embed="rId14"/>
+          <a:blip r:embed="rId13"/>
           <a:stretch>
             <a:fillRect/>
           </a:stretch>
@@ -6377,7 +5206,7 @@
           <p:nvPr/>
         </p:nvPicPr>
         <p:blipFill>
-          <a:blip r:embed="rId8"/>
+          <a:blip r:embed="rId7"/>
           <a:stretch>
             <a:fillRect/>
           </a:stretch>
@@ -6401,7 +5230,7 @@
           <p:nvPr/>
         </p:nvPicPr>
         <p:blipFill>
-          <a:blip r:embed="rId8"/>
+          <a:blip r:embed="rId7"/>
           <a:stretch>
             <a:fillRect/>
           </a:stretch>
@@ -6425,7 +5254,7 @@
           <p:nvPr/>
         </p:nvPicPr>
         <p:blipFill>
-          <a:blip r:embed="rId11"/>
+          <a:blip r:embed="rId10"/>
           <a:stretch>
             <a:fillRect/>
           </a:stretch>
@@ -6449,7 +5278,7 @@
           <p:nvPr/>
         </p:nvPicPr>
         <p:blipFill>
-          <a:blip r:embed="rId15"/>
+          <a:blip r:embed="rId14"/>
           <a:stretch>
             <a:fillRect/>
           </a:stretch>
@@ -6473,7 +5302,7 @@
           <p:nvPr/>
         </p:nvPicPr>
         <p:blipFill>
-          <a:blip r:embed="rId8"/>
+          <a:blip r:embed="rId7"/>
           <a:stretch>
             <a:fillRect/>
           </a:stretch>
@@ -6497,7 +5326,7 @@
           <p:nvPr/>
         </p:nvPicPr>
         <p:blipFill>
-          <a:blip r:embed="rId8"/>
+          <a:blip r:embed="rId7"/>
           <a:stretch>
             <a:fillRect/>
           </a:stretch>
@@ -6521,7 +5350,7 @@
           <p:nvPr/>
         </p:nvPicPr>
         <p:blipFill>
-          <a:blip r:embed="rId16"/>
+          <a:blip r:embed="rId15"/>
           <a:stretch>
             <a:fillRect/>
           </a:stretch>
@@ -6545,7 +5374,7 @@
           <p:nvPr/>
         </p:nvPicPr>
         <p:blipFill>
-          <a:blip r:embed="rId17"/>
+          <a:blip r:embed="rId16"/>
           <a:stretch>
             <a:fillRect/>
           </a:stretch>
@@ -6569,7 +5398,7 @@
           <p:nvPr/>
         </p:nvPicPr>
         <p:blipFill>
-          <a:blip r:embed="rId18"/>
+          <a:blip r:embed="rId17"/>
           <a:stretch>
             <a:fillRect/>
           </a:stretch>
@@ -6593,7 +5422,7 @@
           <p:nvPr/>
         </p:nvPicPr>
         <p:blipFill>
-          <a:blip r:embed="rId19"/>
+          <a:blip r:embed="rId18"/>
           <a:stretch>
             <a:fillRect/>
           </a:stretch>
@@ -6617,7 +5446,7 @@
           <p:nvPr/>
         </p:nvPicPr>
         <p:blipFill>
-          <a:blip r:embed="rId18"/>
+          <a:blip r:embed="rId17"/>
           <a:stretch>
             <a:fillRect/>
           </a:stretch>
@@ -6641,7 +5470,7 @@
           <p:nvPr/>
         </p:nvPicPr>
         <p:blipFill>
-          <a:blip r:embed="rId20"/>
+          <a:blip r:embed="rId19"/>
           <a:stretch>
             <a:fillRect/>
           </a:stretch>
@@ -6665,7 +5494,7 @@
           <p:nvPr/>
         </p:nvPicPr>
         <p:blipFill>
-          <a:blip r:embed="rId18"/>
+          <a:blip r:embed="rId17"/>
           <a:stretch>
             <a:fillRect/>
           </a:stretch>
@@ -6689,7 +5518,7 @@
           <p:nvPr/>
         </p:nvPicPr>
         <p:blipFill>
-          <a:blip r:embed="rId21"/>
+          <a:blip r:embed="rId20"/>
           <a:stretch>
             <a:fillRect/>
           </a:stretch>
@@ -7739,7 +6568,7 @@
           <p:nvPr/>
         </p:nvPicPr>
         <p:blipFill>
-          <a:blip r:embed="rId6"/>
+          <a:blip r:embed="rId5"/>
           <a:stretch>
             <a:fillRect/>
           </a:stretch>
@@ -7769,7 +6598,7 @@
           <p:nvPr/>
         </p:nvPicPr>
         <p:blipFill>
-          <a:blip r:embed="rId8"/>
+          <a:blip r:embed="rId7"/>
           <a:stretch>
             <a:fillRect/>
           </a:stretch>
@@ -7799,7 +6628,7 @@
           <p:nvPr/>
         </p:nvPicPr>
         <p:blipFill>
-          <a:blip r:embed="rId8"/>
+          <a:blip r:embed="rId7"/>
           <a:stretch>
             <a:fillRect/>
           </a:stretch>
@@ -8059,7 +6888,7 @@
           <p:nvPr/>
         </p:nvPicPr>
         <p:blipFill>
-          <a:blip r:embed="rId22"/>
+          <a:blip r:embed="rId21"/>
           <a:stretch>
             <a:fillRect/>
           </a:stretch>
@@ -8074,6 +6903,265 @@
           </a:prstGeom>
         </p:spPr>
       </p:pic>
+      <p:pic>
+        <p:nvPicPr>
+          <p:cNvPr id="64" name="Image 21" descr="preencoded.png">
+            <a:extLst>
+              <a:ext uri="{FF2B5EF4-FFF2-40B4-BE49-F238E27FC236}">
+                <a16:creationId xmlns:a16="http://schemas.microsoft.com/office/drawing/2014/main" id="{805F1315-07FA-921A-0AAC-6766D547CC67}"/>
+              </a:ext>
+            </a:extLst>
+          </p:cNvPr>
+          <p:cNvPicPr>
+            <a:picLocks noChangeAspect="1"/>
+          </p:cNvPicPr>
+          <p:nvPr/>
+        </p:nvPicPr>
+        <p:blipFill>
+          <a:blip r:embed="rId8"/>
+          <a:stretch>
+            <a:fillRect/>
+          </a:stretch>
+        </p:blipFill>
+        <p:spPr>
+          <a:xfrm>
+            <a:off x="4159151" y="3614738"/>
+            <a:ext cx="3873550" cy="1143000"/>
+          </a:xfrm>
+          <a:prstGeom prst="rect">
+            <a:avLst/>
+          </a:prstGeom>
+        </p:spPr>
+      </p:pic>
+      <p:pic>
+        <p:nvPicPr>
+          <p:cNvPr id="1028" name="Picture 4" descr="Download Free Blue email Icons in PNG &amp; SVG">
+            <a:extLst>
+              <a:ext uri="{FF2B5EF4-FFF2-40B4-BE49-F238E27FC236}">
+                <a16:creationId xmlns:a16="http://schemas.microsoft.com/office/drawing/2014/main" id="{E1FFE372-DCD1-3F7B-2C3F-44515F461E0B}"/>
+              </a:ext>
+            </a:extLst>
+          </p:cNvPr>
+          <p:cNvPicPr>
+            <a:picLocks noChangeAspect="1" noChangeArrowheads="1"/>
+          </p:cNvPicPr>
+          <p:nvPr/>
+        </p:nvPicPr>
+        <p:blipFill>
+          <a:blip r:embed="rId22">
+            <a:extLst>
+              <a:ext uri="{28A0092B-C50C-407E-A947-70E740481C1C}">
+                <a14:useLocalDpi xmlns:a14="http://schemas.microsoft.com/office/drawing/2010/main" val="0"/>
+              </a:ext>
+            </a:extLst>
+          </a:blip>
+          <a:srcRect/>
+          <a:stretch>
+            <a:fillRect/>
+          </a:stretch>
+        </p:blipFill>
+        <p:spPr bwMode="auto">
+          <a:xfrm>
+            <a:off x="4243492" y="3720969"/>
+            <a:ext cx="292829" cy="292829"/>
+          </a:xfrm>
+          <a:prstGeom prst="rect">
+            <a:avLst/>
+          </a:prstGeom>
+          <a:noFill/>
+          <a:extLst>
+            <a:ext uri="{909E8E84-426E-40DD-AFC4-6F175D3DCCD1}">
+              <a14:hiddenFill xmlns:a14="http://schemas.microsoft.com/office/drawing/2010/main">
+                <a:solidFill>
+                  <a:srgbClr val="FFFFFF"/>
+                </a:solidFill>
+              </a14:hiddenFill>
+            </a:ext>
+          </a:extLst>
+        </p:spPr>
+      </p:pic>
+      <p:sp>
+        <p:nvSpPr>
+          <p:cNvPr id="65" name="Text 14">
+            <a:extLst>
+              <a:ext uri="{FF2B5EF4-FFF2-40B4-BE49-F238E27FC236}">
+                <a16:creationId xmlns:a16="http://schemas.microsoft.com/office/drawing/2014/main" id="{F5A92595-2B58-B344-06DD-6466B43BBD5A}"/>
+              </a:ext>
+            </a:extLst>
+          </p:cNvPr>
+          <p:cNvSpPr/>
+          <p:nvPr/>
+        </p:nvSpPr>
+        <p:spPr>
+          <a:xfrm>
+            <a:off x="4600942" y="3725634"/>
+            <a:ext cx="2732919" cy="342900"/>
+          </a:xfrm>
+          <a:prstGeom prst="rect">
+            <a:avLst/>
+          </a:prstGeom>
+          <a:noFill/>
+          <a:ln/>
+        </p:spPr>
+        <p:txBody>
+          <a:bodyPr vert="horz" wrap="square" lIns="0" tIns="0" rIns="0" bIns="0" rtlCol="0" anchor="t"/>
+          <a:lstStyle/>
+          <a:p>
+            <a:pPr marL="0" indent="0">
+              <a:lnSpc>
+                <a:spcPts val="2025"/>
+              </a:lnSpc>
+              <a:buNone/>
+            </a:pPr>
+            <a:r>
+              <a:rPr lang="en-US" sz="1350" b="1" dirty="0">
+                <a:solidFill>
+                  <a:srgbClr val="000080"/>
+                </a:solidFill>
+                <a:latin typeface="MS Sans Serif" pitchFamily="34" charset="0"/>
+                <a:ea typeface="MS Sans Serif" pitchFamily="34" charset="-122"/>
+                <a:cs typeface="MS Sans Serif" pitchFamily="34" charset="-120"/>
+              </a:rPr>
+              <a:t>Reporting &amp; Email</a:t>
+            </a:r>
+            <a:endParaRPr lang="en-US" sz="1350" dirty="0"/>
+          </a:p>
+        </p:txBody>
+      </p:sp>
+      <p:pic>
+        <p:nvPicPr>
+          <p:cNvPr id="68" name="Image 19" descr="preencoded.png">
+            <a:extLst>
+              <a:ext uri="{FF2B5EF4-FFF2-40B4-BE49-F238E27FC236}">
+                <a16:creationId xmlns:a16="http://schemas.microsoft.com/office/drawing/2014/main" id="{8CA94704-A230-13FA-9F9D-CC89C27733FA}"/>
+              </a:ext>
+            </a:extLst>
+          </p:cNvPr>
+          <p:cNvPicPr>
+            <a:picLocks noChangeAspect="1"/>
+          </p:cNvPicPr>
+          <p:nvPr/>
+        </p:nvPicPr>
+        <p:blipFill>
+          <a:blip r:embed="rId7"/>
+          <a:stretch>
+            <a:fillRect/>
+          </a:stretch>
+        </p:blipFill>
+        <p:spPr>
+          <a:xfrm>
+            <a:off x="4255179" y="4126948"/>
+            <a:ext cx="133350" cy="133350"/>
+          </a:xfrm>
+          <a:prstGeom prst="rect">
+            <a:avLst/>
+          </a:prstGeom>
+        </p:spPr>
+      </p:pic>
+      <p:sp>
+        <p:nvSpPr>
+          <p:cNvPr id="75" name="Text 15">
+            <a:extLst>
+              <a:ext uri="{FF2B5EF4-FFF2-40B4-BE49-F238E27FC236}">
+                <a16:creationId xmlns:a16="http://schemas.microsoft.com/office/drawing/2014/main" id="{8E56DC63-8249-BDD1-885E-C65E18D695A4}"/>
+              </a:ext>
+            </a:extLst>
+          </p:cNvPr>
+          <p:cNvSpPr/>
+          <p:nvPr/>
+        </p:nvSpPr>
+        <p:spPr>
+          <a:xfrm>
+            <a:off x="4273451" y="4093610"/>
+            <a:ext cx="3835301" cy="200025"/>
+          </a:xfrm>
+          <a:prstGeom prst="rect">
+            <a:avLst/>
+          </a:prstGeom>
+          <a:noFill/>
+          <a:ln/>
+        </p:spPr>
+        <p:txBody>
+          <a:bodyPr vert="horz" wrap="square" lIns="0" tIns="0" rIns="0" bIns="0" rtlCol="0" anchor="t"/>
+          <a:lstStyle/>
+          <a:p>
+            <a:pPr marL="342900" indent="-342900" algn="l">
+              <a:lnSpc>
+                <a:spcPts val="1575"/>
+              </a:lnSpc>
+              <a:buSzPct val="100000"/>
+              <a:buChar char="•"/>
+            </a:pPr>
+            <a:r>
+              <a:rPr lang="en-US" sz="1050" dirty="0" err="1">
+                <a:solidFill>
+                  <a:srgbClr val="000000"/>
+                </a:solidFill>
+                <a:latin typeface="MS Sans Serif" pitchFamily="34" charset="0"/>
+                <a:ea typeface="MS Sans Serif" pitchFamily="34" charset="-122"/>
+                <a:cs typeface="MS Sans Serif" pitchFamily="34" charset="-120"/>
+              </a:rPr>
+              <a:t>Generarea</a:t>
+            </a:r>
+            <a:r>
+              <a:rPr lang="en-US" sz="1050" dirty="0">
+                <a:solidFill>
+                  <a:srgbClr val="000000"/>
+                </a:solidFill>
+                <a:latin typeface="MS Sans Serif" pitchFamily="34" charset="0"/>
+                <a:ea typeface="MS Sans Serif" pitchFamily="34" charset="-122"/>
+                <a:cs typeface="MS Sans Serif" pitchFamily="34" charset="-120"/>
+              </a:rPr>
+              <a:t> automata a </a:t>
+            </a:r>
+            <a:r>
+              <a:rPr lang="en-US" sz="1050" dirty="0" err="1">
+                <a:solidFill>
+                  <a:srgbClr val="000000"/>
+                </a:solidFill>
+                <a:latin typeface="MS Sans Serif" pitchFamily="34" charset="0"/>
+                <a:ea typeface="MS Sans Serif" pitchFamily="34" charset="-122"/>
+                <a:cs typeface="MS Sans Serif" pitchFamily="34" charset="-120"/>
+              </a:rPr>
+              <a:t>extrasului</a:t>
+            </a:r>
+            <a:r>
+              <a:rPr lang="en-US" sz="1050" dirty="0">
+                <a:solidFill>
+                  <a:srgbClr val="000000"/>
+                </a:solidFill>
+                <a:latin typeface="MS Sans Serif" pitchFamily="34" charset="0"/>
+                <a:ea typeface="MS Sans Serif" pitchFamily="34" charset="-122"/>
+                <a:cs typeface="MS Sans Serif" pitchFamily="34" charset="-120"/>
+              </a:rPr>
+              <a:t> de </a:t>
+            </a:r>
+            <a:r>
+              <a:rPr lang="en-US" sz="1050" dirty="0" err="1">
+                <a:solidFill>
+                  <a:srgbClr val="000000"/>
+                </a:solidFill>
+                <a:latin typeface="MS Sans Serif" pitchFamily="34" charset="0"/>
+                <a:ea typeface="MS Sans Serif" pitchFamily="34" charset="-122"/>
+                <a:cs typeface="MS Sans Serif" pitchFamily="34" charset="-120"/>
+              </a:rPr>
+              <a:t>cont</a:t>
+            </a:r>
+            <a:r>
+              <a:rPr lang="en-US" sz="1050" dirty="0">
+                <a:solidFill>
+                  <a:srgbClr val="000000"/>
+                </a:solidFill>
+                <a:latin typeface="MS Sans Serif" pitchFamily="34" charset="0"/>
+                <a:ea typeface="MS Sans Serif" pitchFamily="34" charset="-122"/>
+                <a:cs typeface="MS Sans Serif" pitchFamily="34" charset="-120"/>
+              </a:rPr>
+              <a:t> pe mail</a:t>
+            </a:r>
+            <a:endParaRPr lang="en-US" sz="1050" dirty="0"/>
+          </a:p>
+        </p:txBody>
+      </p:sp>
     </p:spTree>
   </p:cSld>
   <p:clrMapOvr>
@@ -8082,7 +7170,7 @@
 </p:sld>
 </file>
 
-<file path=ppt/slides/slide6.xml><?xml version="1.0" encoding="utf-8"?>
+<file path=ppt/slides/slide5.xml><?xml version="1.0" encoding="utf-8"?>
 <p:sld xmlns:a="http://schemas.openxmlformats.org/drawingml/2006/main" xmlns:r="http://schemas.openxmlformats.org/officeDocument/2006/relationships" xmlns:p="http://schemas.openxmlformats.org/presentationml/2006/main">
   <p:cSld name="Slide 6">
     <p:spTree>
@@ -9038,36 +8126,6 @@
           </a:prstGeom>
         </p:spPr>
       </p:pic>
-      <p:pic>
-        <p:nvPicPr>
-          <p:cNvPr id="51" name="Picture 50" descr="A computer screen with a screen and a grid&#10;&#10;AI-generated content may be incorrect.">
-            <a:extLst>
-              <a:ext uri="{FF2B5EF4-FFF2-40B4-BE49-F238E27FC236}">
-                <a16:creationId xmlns:a16="http://schemas.microsoft.com/office/drawing/2014/main" id="{BC8E7D47-9444-A099-96F3-BA087FE8A51C}"/>
-              </a:ext>
-            </a:extLst>
-          </p:cNvPr>
-          <p:cNvPicPr>
-            <a:picLocks noChangeAspect="1"/>
-          </p:cNvPicPr>
-          <p:nvPr/>
-        </p:nvPicPr>
-        <p:blipFill>
-          <a:blip r:embed="rId12"/>
-          <a:stretch>
-            <a:fillRect/>
-          </a:stretch>
-        </p:blipFill>
-        <p:spPr>
-          <a:xfrm>
-            <a:off x="6687035" y="1662228"/>
-            <a:ext cx="4891049" cy="2430818"/>
-          </a:xfrm>
-          <a:prstGeom prst="rect">
-            <a:avLst/>
-          </a:prstGeom>
-        </p:spPr>
-      </p:pic>
       <p:sp>
         <p:nvSpPr>
           <p:cNvPr id="52" name="Text 5">
@@ -9095,11 +8153,10 @@
           <a:bodyPr vert="horz" wrap="square" lIns="0" tIns="0" rIns="0" bIns="0" rtlCol="0" anchor="t"/>
           <a:lstStyle/>
           <a:p>
-            <a:pPr marL="0" indent="0" algn="ctr">
+            <a:pPr algn="ctr">
               <a:lnSpc>
                 <a:spcPts val="2250"/>
               </a:lnSpc>
-              <a:buNone/>
             </a:pPr>
             <a:r>
               <a:rPr lang="en-US" sz="1500" b="1" dirty="0" err="1">
@@ -9110,7 +8167,7 @@
                 <a:ea typeface="MS Sans Serif" pitchFamily="34" charset="-122"/>
                 <a:cs typeface="MS Sans Serif" pitchFamily="34" charset="-120"/>
               </a:rPr>
-              <a:t>Paginile</a:t>
+              <a:t>Pagina</a:t>
             </a:r>
             <a:r>
               <a:rPr lang="en-US" sz="1500" b="1" dirty="0">
@@ -9132,7 +8189,7 @@
                 <a:ea typeface="MS Sans Serif" pitchFamily="34" charset="-122"/>
                 <a:cs typeface="MS Sans Serif" pitchFamily="34" charset="-120"/>
               </a:rPr>
-              <a:t>principale</a:t>
+              <a:t>principală</a:t>
             </a:r>
             <a:endParaRPr lang="en-US" sz="1500" dirty="0"/>
           </a:p>
@@ -9222,6 +8279,36 @@
           </a:p>
         </p:txBody>
       </p:sp>
+      <p:pic>
+        <p:nvPicPr>
+          <p:cNvPr id="11" name="Picture 10" descr="A computer screen on a green hill&#10;&#10;AI-generated content may be incorrect.">
+            <a:extLst>
+              <a:ext uri="{FF2B5EF4-FFF2-40B4-BE49-F238E27FC236}">
+                <a16:creationId xmlns:a16="http://schemas.microsoft.com/office/drawing/2014/main" id="{B84DB683-837F-CB6D-8464-D4FC204E5880}"/>
+              </a:ext>
+            </a:extLst>
+          </p:cNvPr>
+          <p:cNvPicPr>
+            <a:picLocks noChangeAspect="1"/>
+          </p:cNvPicPr>
+          <p:nvPr/>
+        </p:nvPicPr>
+        <p:blipFill>
+          <a:blip r:embed="rId12"/>
+          <a:stretch>
+            <a:fillRect/>
+          </a:stretch>
+        </p:blipFill>
+        <p:spPr>
+          <a:xfrm>
+            <a:off x="6960646" y="1659135"/>
+            <a:ext cx="4166102" cy="2437821"/>
+          </a:xfrm>
+          <a:prstGeom prst="rect">
+            <a:avLst/>
+          </a:prstGeom>
+        </p:spPr>
+      </p:pic>
     </p:spTree>
   </p:cSld>
   <p:clrMapOvr>
@@ -9230,7 +8317,7 @@
 </p:sld>
 </file>
 
-<file path=ppt/slides/slide7.xml><?xml version="1.0" encoding="utf-8"?>
+<file path=ppt/slides/slide6.xml><?xml version="1.0" encoding="utf-8"?>
 <p:sld xmlns:a="http://schemas.openxmlformats.org/drawingml/2006/main" xmlns:r="http://schemas.openxmlformats.org/officeDocument/2006/relationships" xmlns:p="http://schemas.openxmlformats.org/presentationml/2006/main">
   <p:cSld name="Slide 7">
     <p:spTree>
@@ -10279,7 +9366,51 @@
                 <a:ea typeface="MS Sans Serif" pitchFamily="34" charset="-122"/>
                 <a:cs typeface="MS Sans Serif" pitchFamily="34" charset="-120"/>
               </a:rPr>
-              <a:t>Se închide aplicația OldBank. Vă mulțumiți pentru utilizare!</a:t>
+              <a:t>Se închide aplicația OldBank. </a:t>
+            </a:r>
+            <a:r>
+              <a:rPr lang="en-US" sz="1050" dirty="0" err="1">
+                <a:solidFill>
+                  <a:srgbClr val="000000"/>
+                </a:solidFill>
+                <a:latin typeface="MS Sans Serif" pitchFamily="34" charset="0"/>
+                <a:ea typeface="MS Sans Serif" pitchFamily="34" charset="-122"/>
+                <a:cs typeface="MS Sans Serif" pitchFamily="34" charset="-120"/>
+              </a:rPr>
+              <a:t>Vă</a:t>
+            </a:r>
+            <a:r>
+              <a:rPr lang="en-US" sz="1050" dirty="0">
+                <a:solidFill>
+                  <a:srgbClr val="000000"/>
+                </a:solidFill>
+                <a:latin typeface="MS Sans Serif" pitchFamily="34" charset="0"/>
+                <a:ea typeface="MS Sans Serif" pitchFamily="34" charset="-122"/>
+                <a:cs typeface="MS Sans Serif" pitchFamily="34" charset="-120"/>
+              </a:rPr>
+              <a:t> </a:t>
+            </a:r>
+            <a:r>
+              <a:rPr lang="en-US" sz="1050" dirty="0" err="1">
+                <a:solidFill>
+                  <a:srgbClr val="000000"/>
+                </a:solidFill>
+                <a:latin typeface="MS Sans Serif" pitchFamily="34" charset="0"/>
+                <a:ea typeface="MS Sans Serif" pitchFamily="34" charset="-122"/>
+                <a:cs typeface="MS Sans Serif" pitchFamily="34" charset="-120"/>
+              </a:rPr>
+              <a:t>mulțumim</a:t>
+            </a:r>
+            <a:r>
+              <a:rPr lang="en-US" sz="1050" dirty="0">
+                <a:solidFill>
+                  <a:srgbClr val="000000"/>
+                </a:solidFill>
+                <a:latin typeface="MS Sans Serif" pitchFamily="34" charset="0"/>
+                <a:ea typeface="MS Sans Serif" pitchFamily="34" charset="-122"/>
+                <a:cs typeface="MS Sans Serif" pitchFamily="34" charset="-120"/>
+              </a:rPr>
+              <a:t> pentru utilizare!</a:t>
             </a:r>
             <a:endParaRPr lang="en-US" sz="1050" dirty="0"/>
           </a:p>
@@ -10370,6 +9501,601 @@
         </p:txBody>
       </p:sp>
     </p:spTree>
+  </p:cSld>
+  <p:clrMapOvr>
+    <a:masterClrMapping/>
+  </p:clrMapOvr>
+</p:sld>
+</file>
+
+<file path=ppt/slides/slide7.xml><?xml version="1.0" encoding="utf-8"?>
+<p:sld xmlns:a="http://schemas.openxmlformats.org/drawingml/2006/main" xmlns:r="http://schemas.openxmlformats.org/officeDocument/2006/relationships" xmlns:p="http://schemas.openxmlformats.org/presentationml/2006/main">
+  <p:cSld>
+    <p:spTree>
+      <p:nvGrpSpPr>
+        <p:cNvPr id="1" name=""/>
+        <p:cNvGrpSpPr/>
+        <p:nvPr/>
+      </p:nvGrpSpPr>
+      <p:grpSpPr>
+        <a:xfrm>
+          <a:off x="0" y="0"/>
+          <a:ext cx="0" cy="0"/>
+          <a:chOff x="0" y="0"/>
+          <a:chExt cx="0" cy="0"/>
+        </a:xfrm>
+      </p:grpSpPr>
+      <p:pic>
+        <p:nvPicPr>
+          <p:cNvPr id="2" name="Image 0" descr="preencoded.png">
+            <a:extLst>
+              <a:ext uri="{FF2B5EF4-FFF2-40B4-BE49-F238E27FC236}">
+                <a16:creationId xmlns:a16="http://schemas.microsoft.com/office/drawing/2014/main" id="{B4AA898D-78FD-C0F3-1C9F-47BAD69DD367}"/>
+              </a:ext>
+            </a:extLst>
+          </p:cNvPr>
+          <p:cNvPicPr>
+            <a:picLocks noChangeAspect="1"/>
+          </p:cNvPicPr>
+          <p:nvPr/>
+        </p:nvPicPr>
+        <p:blipFill>
+          <a:blip r:embed="rId2"/>
+          <a:stretch>
+            <a:fillRect/>
+          </a:stretch>
+        </p:blipFill>
+        <p:spPr>
+          <a:xfrm>
+            <a:off x="0" y="0"/>
+            <a:ext cx="12192000" cy="6858000"/>
+          </a:xfrm>
+          <a:prstGeom prst="rect">
+            <a:avLst/>
+          </a:prstGeom>
+        </p:spPr>
+      </p:pic>
+      <p:pic>
+        <p:nvPicPr>
+          <p:cNvPr id="3" name="Image 1" descr="preencoded.png">
+            <a:extLst>
+              <a:ext uri="{FF2B5EF4-FFF2-40B4-BE49-F238E27FC236}">
+                <a16:creationId xmlns:a16="http://schemas.microsoft.com/office/drawing/2014/main" id="{CF8F793D-6DFD-2060-6696-975BA47DFD9A}"/>
+              </a:ext>
+            </a:extLst>
+          </p:cNvPr>
+          <p:cNvPicPr>
+            <a:picLocks noChangeAspect="1"/>
+          </p:cNvPicPr>
+          <p:nvPr/>
+        </p:nvPicPr>
+        <p:blipFill>
+          <a:blip r:embed="rId3"/>
+          <a:stretch>
+            <a:fillRect/>
+          </a:stretch>
+        </p:blipFill>
+        <p:spPr>
+          <a:xfrm>
+            <a:off x="0" y="0"/>
+            <a:ext cx="12192000" cy="304800"/>
+          </a:xfrm>
+          <a:prstGeom prst="rect">
+            <a:avLst/>
+          </a:prstGeom>
+        </p:spPr>
+      </p:pic>
+      <p:pic>
+        <p:nvPicPr>
+          <p:cNvPr id="4" name="Image 2" descr="preencoded.png">
+            <a:extLst>
+              <a:ext uri="{FF2B5EF4-FFF2-40B4-BE49-F238E27FC236}">
+                <a16:creationId xmlns:a16="http://schemas.microsoft.com/office/drawing/2014/main" id="{5FD968AF-BC01-3E43-5B64-ED23D77D86B9}"/>
+              </a:ext>
+            </a:extLst>
+          </p:cNvPr>
+          <p:cNvPicPr>
+            <a:picLocks noChangeAspect="1"/>
+          </p:cNvPicPr>
+          <p:nvPr/>
+        </p:nvPicPr>
+        <p:blipFill>
+          <a:blip r:embed="rId4"/>
+          <a:stretch>
+            <a:fillRect/>
+          </a:stretch>
+        </p:blipFill>
+        <p:spPr>
+          <a:xfrm>
+            <a:off x="11410950" y="47625"/>
+            <a:ext cx="209550" cy="209550"/>
+          </a:xfrm>
+          <a:prstGeom prst="rect">
+            <a:avLst/>
+          </a:prstGeom>
+        </p:spPr>
+      </p:pic>
+      <p:pic>
+        <p:nvPicPr>
+          <p:cNvPr id="5" name="Image 3" descr="preencoded.png">
+            <a:extLst>
+              <a:ext uri="{FF2B5EF4-FFF2-40B4-BE49-F238E27FC236}">
+                <a16:creationId xmlns:a16="http://schemas.microsoft.com/office/drawing/2014/main" id="{60C8BF3C-E7C1-C09F-79A6-6F8355DDBABE}"/>
+              </a:ext>
+            </a:extLst>
+          </p:cNvPr>
+          <p:cNvPicPr>
+            <a:picLocks noChangeAspect="1"/>
+          </p:cNvPicPr>
+          <p:nvPr/>
+        </p:nvPicPr>
+        <p:blipFill>
+          <a:blip r:embed="rId4"/>
+          <a:stretch>
+            <a:fillRect/>
+          </a:stretch>
+        </p:blipFill>
+        <p:spPr>
+          <a:xfrm>
+            <a:off x="11658600" y="47625"/>
+            <a:ext cx="209550" cy="209550"/>
+          </a:xfrm>
+          <a:prstGeom prst="rect">
+            <a:avLst/>
+          </a:prstGeom>
+        </p:spPr>
+      </p:pic>
+      <p:pic>
+        <p:nvPicPr>
+          <p:cNvPr id="6" name="Image 4" descr="preencoded.png">
+            <a:extLst>
+              <a:ext uri="{FF2B5EF4-FFF2-40B4-BE49-F238E27FC236}">
+                <a16:creationId xmlns:a16="http://schemas.microsoft.com/office/drawing/2014/main" id="{AFE076EE-7AEE-EEC5-22D8-CD8BA2501294}"/>
+              </a:ext>
+            </a:extLst>
+          </p:cNvPr>
+          <p:cNvPicPr>
+            <a:picLocks noChangeAspect="1"/>
+          </p:cNvPicPr>
+          <p:nvPr/>
+        </p:nvPicPr>
+        <p:blipFill>
+          <a:blip r:embed="rId4"/>
+          <a:stretch>
+            <a:fillRect/>
+          </a:stretch>
+        </p:blipFill>
+        <p:spPr>
+          <a:xfrm>
+            <a:off x="11906250" y="47625"/>
+            <a:ext cx="209550" cy="209550"/>
+          </a:xfrm>
+          <a:prstGeom prst="rect">
+            <a:avLst/>
+          </a:prstGeom>
+        </p:spPr>
+      </p:pic>
+      <p:sp>
+        <p:nvSpPr>
+          <p:cNvPr id="7" name="Text 0">
+            <a:extLst>
+              <a:ext uri="{FF2B5EF4-FFF2-40B4-BE49-F238E27FC236}">
+                <a16:creationId xmlns:a16="http://schemas.microsoft.com/office/drawing/2014/main" id="{449C429C-C22C-E101-A360-737AF5CF16AF}"/>
+              </a:ext>
+            </a:extLst>
+          </p:cNvPr>
+          <p:cNvSpPr/>
+          <p:nvPr/>
+        </p:nvSpPr>
+        <p:spPr>
+          <a:xfrm>
+            <a:off x="76200" y="38100"/>
+            <a:ext cx="2693551" cy="228600"/>
+          </a:xfrm>
+          <a:prstGeom prst="rect">
+            <a:avLst/>
+          </a:prstGeom>
+          <a:noFill/>
+          <a:ln/>
+        </p:spPr>
+        <p:txBody>
+          <a:bodyPr vert="horz" wrap="square" lIns="0" tIns="0" rIns="0" bIns="0" rtlCol="0" anchor="t"/>
+          <a:lstStyle/>
+          <a:p>
+            <a:pPr marL="0" indent="0">
+              <a:lnSpc>
+                <a:spcPts val="1800"/>
+              </a:lnSpc>
+              <a:buNone/>
+            </a:pPr>
+            <a:r>
+              <a:rPr lang="en-US" sz="1200" dirty="0">
+                <a:solidFill>
+                  <a:srgbClr val="FFFFFF"/>
+                </a:solidFill>
+                <a:latin typeface="MS Sans Serif" pitchFamily="34" charset="0"/>
+                <a:ea typeface="MS Sans Serif" pitchFamily="34" charset="-122"/>
+                <a:cs typeface="MS Sans Serif" pitchFamily="34" charset="-120"/>
+              </a:rPr>
+              <a:t>Demo- OldBank</a:t>
+            </a:r>
+            <a:endParaRPr lang="en-US" sz="1200" dirty="0"/>
+          </a:p>
+        </p:txBody>
+      </p:sp>
+      <p:sp>
+        <p:nvSpPr>
+          <p:cNvPr id="8" name="Text 1">
+            <a:extLst>
+              <a:ext uri="{FF2B5EF4-FFF2-40B4-BE49-F238E27FC236}">
+                <a16:creationId xmlns:a16="http://schemas.microsoft.com/office/drawing/2014/main" id="{B6E611F7-01A4-3CAE-4E73-69EA193ACCF9}"/>
+              </a:ext>
+            </a:extLst>
+          </p:cNvPr>
+          <p:cNvSpPr/>
+          <p:nvPr/>
+        </p:nvSpPr>
+        <p:spPr>
+          <a:xfrm>
+            <a:off x="11473309" y="47625"/>
+            <a:ext cx="209550" cy="209550"/>
+          </a:xfrm>
+          <a:prstGeom prst="rect">
+            <a:avLst/>
+          </a:prstGeom>
+          <a:noFill/>
+          <a:ln/>
+        </p:spPr>
+        <p:txBody>
+          <a:bodyPr vert="horz" wrap="square" lIns="0" tIns="0" rIns="0" bIns="0" rtlCol="0" anchor="t"/>
+          <a:lstStyle/>
+          <a:p>
+            <a:pPr marL="0" indent="0">
+              <a:lnSpc>
+                <a:spcPts val="1800"/>
+              </a:lnSpc>
+              <a:buNone/>
+            </a:pPr>
+            <a:r>
+              <a:rPr lang="en-US" sz="1200" b="1" dirty="0">
+                <a:solidFill>
+                  <a:srgbClr val="FFFFFF"/>
+                </a:solidFill>
+                <a:latin typeface="MS Sans Serif" pitchFamily="34" charset="0"/>
+                <a:ea typeface="MS Sans Serif" pitchFamily="34" charset="-122"/>
+                <a:cs typeface="MS Sans Serif" pitchFamily="34" charset="-120"/>
+              </a:rPr>
+              <a:t>_</a:t>
+            </a:r>
+            <a:endParaRPr lang="en-US" sz="1200" dirty="0"/>
+          </a:p>
+        </p:txBody>
+      </p:sp>
+      <p:sp>
+        <p:nvSpPr>
+          <p:cNvPr id="9" name="Text 2">
+            <a:extLst>
+              <a:ext uri="{FF2B5EF4-FFF2-40B4-BE49-F238E27FC236}">
+                <a16:creationId xmlns:a16="http://schemas.microsoft.com/office/drawing/2014/main" id="{F901839E-E304-D1CF-DAAA-57118CF525A7}"/>
+              </a:ext>
+            </a:extLst>
+          </p:cNvPr>
+          <p:cNvSpPr/>
+          <p:nvPr/>
+        </p:nvSpPr>
+        <p:spPr>
+          <a:xfrm>
+            <a:off x="11717238" y="47625"/>
+            <a:ext cx="209550" cy="209550"/>
+          </a:xfrm>
+          <a:prstGeom prst="rect">
+            <a:avLst/>
+          </a:prstGeom>
+          <a:noFill/>
+          <a:ln/>
+        </p:spPr>
+        <p:txBody>
+          <a:bodyPr vert="horz" wrap="square" lIns="0" tIns="0" rIns="0" bIns="0" rtlCol="0" anchor="t"/>
+          <a:lstStyle/>
+          <a:p>
+            <a:pPr marL="0" indent="0">
+              <a:lnSpc>
+                <a:spcPts val="1800"/>
+              </a:lnSpc>
+              <a:buNone/>
+            </a:pPr>
+            <a:r>
+              <a:rPr lang="en-US" sz="1200" b="1" dirty="0">
+                <a:solidFill>
+                  <a:srgbClr val="FFFFFF"/>
+                </a:solidFill>
+                <a:latin typeface="MS Sans Serif" pitchFamily="34" charset="0"/>
+                <a:ea typeface="MS Sans Serif" pitchFamily="34" charset="-122"/>
+                <a:cs typeface="MS Sans Serif" pitchFamily="34" charset="-120"/>
+              </a:rPr>
+              <a:t>□</a:t>
+            </a:r>
+            <a:endParaRPr lang="en-US" sz="1200" dirty="0"/>
+          </a:p>
+        </p:txBody>
+      </p:sp>
+      <p:sp>
+        <p:nvSpPr>
+          <p:cNvPr id="10" name="Text 3">
+            <a:extLst>
+              <a:ext uri="{FF2B5EF4-FFF2-40B4-BE49-F238E27FC236}">
+                <a16:creationId xmlns:a16="http://schemas.microsoft.com/office/drawing/2014/main" id="{F9967DE6-310F-4F39-7F86-A2665CEE811C}"/>
+              </a:ext>
+            </a:extLst>
+          </p:cNvPr>
+          <p:cNvSpPr/>
+          <p:nvPr/>
+        </p:nvSpPr>
+        <p:spPr>
+          <a:xfrm>
+            <a:off x="11966525" y="47625"/>
+            <a:ext cx="209550" cy="209550"/>
+          </a:xfrm>
+          <a:prstGeom prst="rect">
+            <a:avLst/>
+          </a:prstGeom>
+          <a:noFill/>
+          <a:ln/>
+        </p:spPr>
+        <p:txBody>
+          <a:bodyPr vert="horz" wrap="square" lIns="0" tIns="0" rIns="0" bIns="0" rtlCol="0" anchor="t"/>
+          <a:lstStyle/>
+          <a:p>
+            <a:pPr marL="0" indent="0">
+              <a:lnSpc>
+                <a:spcPts val="1800"/>
+              </a:lnSpc>
+              <a:buNone/>
+            </a:pPr>
+            <a:r>
+              <a:rPr lang="en-US" sz="1200" b="1" dirty="0">
+                <a:solidFill>
+                  <a:srgbClr val="FFFFFF"/>
+                </a:solidFill>
+                <a:latin typeface="MS Sans Serif" pitchFamily="34" charset="0"/>
+                <a:ea typeface="MS Sans Serif" pitchFamily="34" charset="-122"/>
+                <a:cs typeface="MS Sans Serif" pitchFamily="34" charset="-120"/>
+              </a:rPr>
+              <a:t>×</a:t>
+            </a:r>
+            <a:endParaRPr lang="en-US" sz="1200" dirty="0"/>
+          </a:p>
+        </p:txBody>
+      </p:sp>
+      <p:pic>
+        <p:nvPicPr>
+          <p:cNvPr id="11" name="Image 7" descr="preencoded.png">
+            <a:extLst>
+              <a:ext uri="{FF2B5EF4-FFF2-40B4-BE49-F238E27FC236}">
+                <a16:creationId xmlns:a16="http://schemas.microsoft.com/office/drawing/2014/main" id="{3005794E-10A0-791A-2FCA-4C6FDDD1FBFD}"/>
+              </a:ext>
+            </a:extLst>
+          </p:cNvPr>
+          <p:cNvPicPr>
+            <a:picLocks noChangeAspect="1"/>
+          </p:cNvPicPr>
+          <p:nvPr/>
+        </p:nvPicPr>
+        <p:blipFill>
+          <a:blip r:embed="rId5"/>
+          <a:stretch>
+            <a:fillRect/>
+          </a:stretch>
+        </p:blipFill>
+        <p:spPr>
+          <a:xfrm>
+            <a:off x="3006983" y="1247139"/>
+            <a:ext cx="6178034" cy="3819752"/>
+          </a:xfrm>
+          <a:prstGeom prst="rect">
+            <a:avLst/>
+          </a:prstGeom>
+        </p:spPr>
+      </p:pic>
+      <p:sp>
+        <p:nvSpPr>
+          <p:cNvPr id="13" name="TextBox 12">
+            <a:extLst>
+              <a:ext uri="{FF2B5EF4-FFF2-40B4-BE49-F238E27FC236}">
+                <a16:creationId xmlns:a16="http://schemas.microsoft.com/office/drawing/2014/main" id="{0FCFE90C-5D11-10CD-34C7-5F6E296CC97A}"/>
+              </a:ext>
+            </a:extLst>
+          </p:cNvPr>
+          <p:cNvSpPr txBox="1"/>
+          <p:nvPr/>
+        </p:nvSpPr>
+        <p:spPr>
+          <a:xfrm>
+            <a:off x="3042920" y="2994855"/>
+            <a:ext cx="6106160" cy="461858"/>
+          </a:xfrm>
+          <a:prstGeom prst="rect">
+            <a:avLst/>
+          </a:prstGeom>
+          <a:noFill/>
+        </p:spPr>
+        <p:txBody>
+          <a:bodyPr wrap="square">
+            <a:spAutoFit/>
+          </a:bodyPr>
+          <a:lstStyle/>
+          <a:p>
+            <a:pPr marL="0" indent="0" algn="ctr">
+              <a:lnSpc>
+                <a:spcPts val="1800"/>
+              </a:lnSpc>
+              <a:buNone/>
+            </a:pPr>
+            <a:r>
+              <a:rPr lang="en-US" sz="6000" b="1" dirty="0">
+                <a:solidFill>
+                  <a:srgbClr val="000000"/>
+                </a:solidFill>
+                <a:latin typeface="MS Sans Serif" pitchFamily="34" charset="0"/>
+                <a:ea typeface="MS Sans Serif" pitchFamily="34" charset="-122"/>
+                <a:cs typeface="MS Sans Serif" pitchFamily="34" charset="-120"/>
+              </a:rPr>
+              <a:t>Demo Time!</a:t>
+            </a:r>
+            <a:endParaRPr lang="en-US" sz="6000" b="1" dirty="0"/>
+          </a:p>
+        </p:txBody>
+      </p:sp>
+      <p:pic>
+        <p:nvPicPr>
+          <p:cNvPr id="14" name="Image 20" descr="preencoded.png">
+            <a:extLst>
+              <a:ext uri="{FF2B5EF4-FFF2-40B4-BE49-F238E27FC236}">
+                <a16:creationId xmlns:a16="http://schemas.microsoft.com/office/drawing/2014/main" id="{54F56EE3-259E-637B-F078-8FC8478D7C88}"/>
+              </a:ext>
+            </a:extLst>
+          </p:cNvPr>
+          <p:cNvPicPr>
+            <a:picLocks noChangeAspect="1"/>
+          </p:cNvPicPr>
+          <p:nvPr/>
+        </p:nvPicPr>
+        <p:blipFill>
+          <a:blip r:embed="rId6"/>
+          <a:stretch>
+            <a:fillRect/>
+          </a:stretch>
+        </p:blipFill>
+        <p:spPr>
+          <a:xfrm>
+            <a:off x="3116513" y="1384677"/>
+            <a:ext cx="681046" cy="605374"/>
+          </a:xfrm>
+          <a:prstGeom prst="rect">
+            <a:avLst/>
+          </a:prstGeom>
+        </p:spPr>
+      </p:pic>
+      <p:sp>
+        <p:nvSpPr>
+          <p:cNvPr id="15" name="TextBox 14">
+            <a:extLst>
+              <a:ext uri="{FF2B5EF4-FFF2-40B4-BE49-F238E27FC236}">
+                <a16:creationId xmlns:a16="http://schemas.microsoft.com/office/drawing/2014/main" id="{F2552481-4540-F247-ACCA-5F7B50195868}"/>
+              </a:ext>
+            </a:extLst>
+          </p:cNvPr>
+          <p:cNvSpPr txBox="1"/>
+          <p:nvPr/>
+        </p:nvSpPr>
+        <p:spPr>
+          <a:xfrm>
+            <a:off x="76200" y="6294500"/>
+            <a:ext cx="2034399" cy="307777"/>
+          </a:xfrm>
+          <a:prstGeom prst="rect">
+            <a:avLst/>
+          </a:prstGeom>
+          <a:noFill/>
+        </p:spPr>
+        <p:txBody>
+          <a:bodyPr wrap="square" rtlCol="0">
+            <a:spAutoFit/>
+          </a:bodyPr>
+          <a:lstStyle/>
+          <a:p>
+            <a:r>
+              <a:rPr lang="en-US" sz="1400" b="1" dirty="0">
+                <a:latin typeface="Courier New" panose="02070309020205020404" pitchFamily="49" charset="0"/>
+                <a:cs typeface="Courier New" panose="02070309020205020404" pitchFamily="49" charset="0"/>
+              </a:rPr>
+              <a:t>Activate Windows</a:t>
+            </a:r>
+            <a:endParaRPr lang="en-GB" sz="1400" b="1" dirty="0">
+              <a:latin typeface="Courier New" panose="02070309020205020404" pitchFamily="49" charset="0"/>
+              <a:cs typeface="Courier New" panose="02070309020205020404" pitchFamily="49" charset="0"/>
+            </a:endParaRPr>
+          </a:p>
+        </p:txBody>
+      </p:sp>
+      <p:sp>
+        <p:nvSpPr>
+          <p:cNvPr id="16" name="TextBox 15">
+            <a:extLst>
+              <a:ext uri="{FF2B5EF4-FFF2-40B4-BE49-F238E27FC236}">
+                <a16:creationId xmlns:a16="http://schemas.microsoft.com/office/drawing/2014/main" id="{67C0A42F-4FE7-E960-ECEB-96D09310CD3D}"/>
+              </a:ext>
+            </a:extLst>
+          </p:cNvPr>
+          <p:cNvSpPr txBox="1"/>
+          <p:nvPr/>
+        </p:nvSpPr>
+        <p:spPr>
+          <a:xfrm>
+            <a:off x="76198" y="6515189"/>
+            <a:ext cx="3886978" cy="307777"/>
+          </a:xfrm>
+          <a:prstGeom prst="rect">
+            <a:avLst/>
+          </a:prstGeom>
+          <a:noFill/>
+        </p:spPr>
+        <p:txBody>
+          <a:bodyPr wrap="square" rtlCol="0">
+            <a:spAutoFit/>
+          </a:bodyPr>
+          <a:lstStyle/>
+          <a:p>
+            <a:r>
+              <a:rPr lang="en-US" sz="1400" b="1" dirty="0">
+                <a:latin typeface="Courier New" panose="02070309020205020404" pitchFamily="49" charset="0"/>
+                <a:cs typeface="Courier New" panose="02070309020205020404" pitchFamily="49" charset="0"/>
+              </a:rPr>
+              <a:t>Go to settings to Activate Windows</a:t>
+            </a:r>
+            <a:endParaRPr lang="en-GB" sz="1400" b="1" dirty="0">
+              <a:latin typeface="Courier New" panose="02070309020205020404" pitchFamily="49" charset="0"/>
+              <a:cs typeface="Courier New" panose="02070309020205020404" pitchFamily="49" charset="0"/>
+            </a:endParaRPr>
+          </a:p>
+        </p:txBody>
+      </p:sp>
+      <p:pic>
+        <p:nvPicPr>
+          <p:cNvPr id="17" name="Image 8" descr="preencoded.png">
+            <a:extLst>
+              <a:ext uri="{FF2B5EF4-FFF2-40B4-BE49-F238E27FC236}">
+                <a16:creationId xmlns:a16="http://schemas.microsoft.com/office/drawing/2014/main" id="{64814E2A-E570-1CE9-515C-71ACE850A4AE}"/>
+              </a:ext>
+            </a:extLst>
+          </p:cNvPr>
+          <p:cNvPicPr>
+            <a:picLocks noChangeAspect="1"/>
+          </p:cNvPicPr>
+          <p:nvPr/>
+        </p:nvPicPr>
+        <p:blipFill>
+          <a:blip r:embed="rId7"/>
+          <a:stretch>
+            <a:fillRect/>
+          </a:stretch>
+        </p:blipFill>
+        <p:spPr>
+          <a:xfrm>
+            <a:off x="8084743" y="4130910"/>
+            <a:ext cx="994293" cy="795434"/>
+          </a:xfrm>
+          <a:prstGeom prst="rect">
+            <a:avLst/>
+          </a:prstGeom>
+        </p:spPr>
+      </p:pic>
+    </p:spTree>
+    <p:extLst>
+      <p:ext uri="{BB962C8B-B14F-4D97-AF65-F5344CB8AC3E}">
+        <p14:creationId xmlns:p14="http://schemas.microsoft.com/office/powerpoint/2010/main" val="3993387210"/>
+      </p:ext>
+    </p:extLst>
   </p:cSld>
   <p:clrMapOvr>
     <a:masterClrMapping/>

</xml_diff>